<commit_message>
R vs mua works but still dependent on N and I think units are wrong
</commit_message>
<xml_diff>
--- a/voortgang2.pptx
+++ b/voortgang2.pptx
@@ -7,6 +7,12 @@
   <p:sldIdLst>
     <p:sldId id="257" r:id="rId2"/>
     <p:sldId id="258" r:id="rId3"/>
+    <p:sldId id="263" r:id="rId4"/>
+    <p:sldId id="262" r:id="rId5"/>
+    <p:sldId id="259" r:id="rId6"/>
+    <p:sldId id="260" r:id="rId7"/>
+    <p:sldId id="261" r:id="rId8"/>
+    <p:sldId id="264" r:id="rId9"/>
   </p:sldIdLst>
   <p:sldSz cx="9144000" cy="6858000" type="screen4x3"/>
   <p:notesSz cx="6858000" cy="9144000"/>
@@ -289,7 +295,7 @@
           <a:p>
             <a:fld id="{AA235DB2-BA32-41AD-AE30-96D32D1E736B}" type="datetimeFigureOut">
               <a:rPr lang="nl-NL" smtClean="0"/>
-              <a:t>7-5-2018</a:t>
+              <a:t>9-5-2018</a:t>
             </a:fld>
             <a:endParaRPr lang="nl-NL"/>
           </a:p>
@@ -459,7 +465,7 @@
           <a:p>
             <a:fld id="{AA235DB2-BA32-41AD-AE30-96D32D1E736B}" type="datetimeFigureOut">
               <a:rPr lang="nl-NL" smtClean="0"/>
-              <a:t>7-5-2018</a:t>
+              <a:t>9-5-2018</a:t>
             </a:fld>
             <a:endParaRPr lang="nl-NL"/>
           </a:p>
@@ -639,7 +645,7 @@
           <a:p>
             <a:fld id="{AA235DB2-BA32-41AD-AE30-96D32D1E736B}" type="datetimeFigureOut">
               <a:rPr lang="nl-NL" smtClean="0"/>
-              <a:t>7-5-2018</a:t>
+              <a:t>9-5-2018</a:t>
             </a:fld>
             <a:endParaRPr lang="nl-NL"/>
           </a:p>
@@ -809,7 +815,7 @@
           <a:p>
             <a:fld id="{AA235DB2-BA32-41AD-AE30-96D32D1E736B}" type="datetimeFigureOut">
               <a:rPr lang="nl-NL" smtClean="0"/>
-              <a:t>7-5-2018</a:t>
+              <a:t>9-5-2018</a:t>
             </a:fld>
             <a:endParaRPr lang="nl-NL"/>
           </a:p>
@@ -1055,7 +1061,7 @@
           <a:p>
             <a:fld id="{AA235DB2-BA32-41AD-AE30-96D32D1E736B}" type="datetimeFigureOut">
               <a:rPr lang="nl-NL" smtClean="0"/>
-              <a:t>7-5-2018</a:t>
+              <a:t>9-5-2018</a:t>
             </a:fld>
             <a:endParaRPr lang="nl-NL"/>
           </a:p>
@@ -1343,7 +1349,7 @@
           <a:p>
             <a:fld id="{AA235DB2-BA32-41AD-AE30-96D32D1E736B}" type="datetimeFigureOut">
               <a:rPr lang="nl-NL" smtClean="0"/>
-              <a:t>7-5-2018</a:t>
+              <a:t>9-5-2018</a:t>
             </a:fld>
             <a:endParaRPr lang="nl-NL"/>
           </a:p>
@@ -1765,7 +1771,7 @@
           <a:p>
             <a:fld id="{AA235DB2-BA32-41AD-AE30-96D32D1E736B}" type="datetimeFigureOut">
               <a:rPr lang="nl-NL" smtClean="0"/>
-              <a:t>7-5-2018</a:t>
+              <a:t>9-5-2018</a:t>
             </a:fld>
             <a:endParaRPr lang="nl-NL"/>
           </a:p>
@@ -1883,7 +1889,7 @@
           <a:p>
             <a:fld id="{AA235DB2-BA32-41AD-AE30-96D32D1E736B}" type="datetimeFigureOut">
               <a:rPr lang="nl-NL" smtClean="0"/>
-              <a:t>7-5-2018</a:t>
+              <a:t>9-5-2018</a:t>
             </a:fld>
             <a:endParaRPr lang="nl-NL"/>
           </a:p>
@@ -1978,7 +1984,7 @@
           <a:p>
             <a:fld id="{AA235DB2-BA32-41AD-AE30-96D32D1E736B}" type="datetimeFigureOut">
               <a:rPr lang="nl-NL" smtClean="0"/>
-              <a:t>7-5-2018</a:t>
+              <a:t>9-5-2018</a:t>
             </a:fld>
             <a:endParaRPr lang="nl-NL"/>
           </a:p>
@@ -2255,7 +2261,7 @@
           <a:p>
             <a:fld id="{AA235DB2-BA32-41AD-AE30-96D32D1E736B}" type="datetimeFigureOut">
               <a:rPr lang="nl-NL" smtClean="0"/>
-              <a:t>7-5-2018</a:t>
+              <a:t>9-5-2018</a:t>
             </a:fld>
             <a:endParaRPr lang="nl-NL"/>
           </a:p>
@@ -2508,7 +2514,7 @@
           <a:p>
             <a:fld id="{AA235DB2-BA32-41AD-AE30-96D32D1E736B}" type="datetimeFigureOut">
               <a:rPr lang="nl-NL" smtClean="0"/>
-              <a:t>7-5-2018</a:t>
+              <a:t>9-5-2018</a:t>
             </a:fld>
             <a:endParaRPr lang="nl-NL"/>
           </a:p>
@@ -2721,7 +2727,7 @@
           <a:p>
             <a:fld id="{AA235DB2-BA32-41AD-AE30-96D32D1E736B}" type="datetimeFigureOut">
               <a:rPr lang="nl-NL" smtClean="0"/>
-              <a:t>7-5-2018</a:t>
+              <a:t>9-5-2018</a:t>
             </a:fld>
             <a:endParaRPr lang="nl-NL"/>
           </a:p>
@@ -3115,90 +3121,6 @@
           </a:p>
         </p:txBody>
       </p:sp>
-      <p:sp>
-        <p:nvSpPr>
-          <p:cNvPr id="3" name="Tijdelijke aanduiding voor inhoud 2"/>
-          <p:cNvSpPr>
-            <a:spLocks noGrp="1"/>
-          </p:cNvSpPr>
-          <p:nvPr>
-            <p:ph idx="1"/>
-          </p:nvPr>
-        </p:nvSpPr>
-        <p:spPr>
-          <a:xfrm>
-            <a:off x="6400800" y="1600200"/>
-            <a:ext cx="2286000" cy="4525963"/>
-          </a:xfrm>
-        </p:spPr>
-        <p:txBody>
-          <a:bodyPr/>
-          <a:lstStyle/>
-          <a:p>
-            <a:pPr marL="0" indent="0">
-              <a:buNone/>
-            </a:pPr>
-            <a:r>
-              <a:rPr lang="nl-NL" dirty="0" smtClean="0"/>
-              <a:t>g = 0.8</a:t>
-            </a:r>
-          </a:p>
-          <a:p>
-            <a:pPr marL="0" indent="0">
-              <a:buNone/>
-            </a:pPr>
-            <a:r>
-              <a:rPr lang="nl-NL" dirty="0" err="1" smtClean="0"/>
-              <a:t>mu_a</a:t>
-            </a:r>
-            <a:r>
-              <a:rPr lang="nl-NL" dirty="0" smtClean="0"/>
-              <a:t> = 1</a:t>
-            </a:r>
-          </a:p>
-          <a:p>
-            <a:pPr marL="0" indent="0">
-              <a:buNone/>
-            </a:pPr>
-            <a:r>
-              <a:rPr lang="nl-NL" dirty="0" err="1" smtClean="0"/>
-              <a:t>mu_s</a:t>
-            </a:r>
-            <a:r>
-              <a:rPr lang="nl-NL" dirty="0" smtClean="0"/>
-              <a:t>* = 10</a:t>
-            </a:r>
-          </a:p>
-          <a:p>
-            <a:pPr marL="0" indent="0">
-              <a:buNone/>
-            </a:pPr>
-            <a:r>
-              <a:rPr lang="nl-NL" dirty="0" smtClean="0"/>
-              <a:t>Bins = 200</a:t>
-            </a:r>
-          </a:p>
-          <a:p>
-            <a:pPr marL="0" indent="0">
-              <a:buNone/>
-            </a:pPr>
-            <a:r>
-              <a:rPr lang="nl-NL" dirty="0" smtClean="0"/>
-              <a:t>Aantal =</a:t>
-            </a:r>
-          </a:p>
-          <a:p>
-            <a:pPr marL="0" indent="0">
-              <a:buNone/>
-            </a:pPr>
-            <a:r>
-              <a:rPr lang="nl-NL" dirty="0" smtClean="0"/>
-              <a:t>1.000.000</a:t>
-            </a:r>
-            <a:endParaRPr lang="nl-NL" dirty="0"/>
-          </a:p>
-        </p:txBody>
-      </p:sp>
       <p:pic>
         <p:nvPicPr>
           <p:cNvPr id="5" name="Afbeelding 4"/>
@@ -3221,7 +3143,7 @@
         </p:blipFill>
         <p:spPr>
           <a:xfrm>
-            <a:off x="816429" y="5682343"/>
+            <a:off x="304800" y="5609024"/>
             <a:ext cx="5106113" cy="514422"/>
           </a:xfrm>
           <a:prstGeom prst="rect">
@@ -3251,14 +3173,98 @@
         </p:blipFill>
         <p:spPr>
           <a:xfrm>
-            <a:off x="443399" y="943011"/>
-            <a:ext cx="5852172" cy="4352553"/>
+            <a:off x="63443" y="943012"/>
+            <a:ext cx="5651557" cy="4203346"/>
           </a:xfrm>
           <a:prstGeom prst="rect">
             <a:avLst/>
           </a:prstGeom>
         </p:spPr>
       </p:pic>
+      <p:sp>
+        <p:nvSpPr>
+          <p:cNvPr id="3" name="Tijdelijke aanduiding voor inhoud 2"/>
+          <p:cNvSpPr>
+            <a:spLocks noGrp="1"/>
+          </p:cNvSpPr>
+          <p:nvPr>
+            <p:ph idx="1"/>
+          </p:nvPr>
+        </p:nvSpPr>
+        <p:spPr>
+          <a:xfrm>
+            <a:off x="5638800" y="1600200"/>
+            <a:ext cx="3505200" cy="4525963"/>
+          </a:xfrm>
+        </p:spPr>
+        <p:txBody>
+          <a:bodyPr/>
+          <a:lstStyle/>
+          <a:p>
+            <a:pPr marL="0" indent="0">
+              <a:buNone/>
+            </a:pPr>
+            <a:r>
+              <a:rPr lang="nl-NL" dirty="0" smtClean="0"/>
+              <a:t>g = 0.8</a:t>
+            </a:r>
+          </a:p>
+          <a:p>
+            <a:pPr marL="0" indent="0">
+              <a:buNone/>
+            </a:pPr>
+            <a:r>
+              <a:rPr lang="nl-NL" dirty="0" err="1" smtClean="0"/>
+              <a:t>mu_a</a:t>
+            </a:r>
+            <a:r>
+              <a:rPr lang="nl-NL" dirty="0" smtClean="0"/>
+              <a:t> = 1 / cm^2</a:t>
+            </a:r>
+          </a:p>
+          <a:p>
+            <a:pPr marL="0" indent="0">
+              <a:buNone/>
+            </a:pPr>
+            <a:r>
+              <a:rPr lang="nl-NL" dirty="0" err="1" smtClean="0"/>
+              <a:t>mu_s</a:t>
+            </a:r>
+            <a:r>
+              <a:rPr lang="nl-NL" dirty="0" smtClean="0"/>
+              <a:t>* = 10 / cm^2</a:t>
+            </a:r>
+          </a:p>
+          <a:p>
+            <a:pPr marL="0" indent="0">
+              <a:buNone/>
+            </a:pPr>
+            <a:r>
+              <a:rPr lang="nl-NL" dirty="0" smtClean="0"/>
+              <a:t>Bins = 200</a:t>
+            </a:r>
+          </a:p>
+          <a:p>
+            <a:pPr marL="0" indent="0">
+              <a:buNone/>
+            </a:pPr>
+            <a:r>
+              <a:rPr lang="nl-NL" dirty="0" smtClean="0"/>
+              <a:t>Aantal =</a:t>
+            </a:r>
+          </a:p>
+          <a:p>
+            <a:pPr marL="0" indent="0">
+              <a:buNone/>
+            </a:pPr>
+            <a:r>
+              <a:rPr lang="nl-NL" dirty="0" smtClean="0"/>
+              <a:t>1.000.000</a:t>
+            </a:r>
+            <a:endParaRPr lang="nl-NL" dirty="0"/>
+          </a:p>
+        </p:txBody>
+      </p:sp>
     </p:spTree>
     <p:extLst>
       <p:ext uri="{BB962C8B-B14F-4D97-AF65-F5344CB8AC3E}">
@@ -3308,25 +3314,35 @@
           </a:p>
         </p:txBody>
       </p:sp>
-      <p:sp>
-        <p:nvSpPr>
-          <p:cNvPr id="3" name="Tijdelijke aanduiding voor inhoud 2"/>
-          <p:cNvSpPr>
-            <a:spLocks noGrp="1"/>
-          </p:cNvSpPr>
+      <p:pic>
+        <p:nvPicPr>
+          <p:cNvPr id="5" name="Tijdelijke aanduiding voor inhoud 4"/>
+          <p:cNvPicPr>
+            <a:picLocks noGrp="1" noChangeAspect="1"/>
+          </p:cNvPicPr>
           <p:nvPr>
             <p:ph idx="1"/>
           </p:nvPr>
-        </p:nvSpPr>
-        <p:spPr/>
-        <p:txBody>
-          <a:bodyPr/>
-          <a:lstStyle/>
-          <a:p>
-            <a:endParaRPr lang="nl-NL"/>
-          </a:p>
-        </p:txBody>
-      </p:sp>
+        </p:nvPicPr>
+        <p:blipFill>
+          <a:blip r:embed="rId2">
+            <a:extLst>
+              <a:ext uri="{28A0092B-C50C-407E-A947-70E740481C1C}">
+                <a14:useLocalDpi xmlns:a14="http://schemas.microsoft.com/office/drawing/2010/main" val="0"/>
+              </a:ext>
+            </a:extLst>
+          </a:blip>
+          <a:stretch>
+            <a:fillRect/>
+          </a:stretch>
+        </p:blipFill>
+        <p:spPr>
+          <a:xfrm>
+            <a:off x="-20782" y="1066800"/>
+            <a:ext cx="5532502" cy="4114799"/>
+          </a:xfrm>
+        </p:spPr>
+      </p:pic>
       <p:sp>
         <p:nvSpPr>
           <p:cNvPr id="4" name="Tijdelijke aanduiding voor inhoud 2"/>
@@ -3337,8 +3353,8 @@
         </p:nvSpPr>
         <p:spPr>
           <a:xfrm>
-            <a:off x="6400800" y="1600200"/>
-            <a:ext cx="2286000" cy="4525963"/>
+            <a:off x="5486400" y="1600200"/>
+            <a:ext cx="3657600" cy="4525963"/>
           </a:xfrm>
           <a:prstGeom prst="rect">
             <a:avLst/>
@@ -3506,7 +3522,7 @@
             </a:r>
             <a:r>
               <a:rPr lang="nl-NL" dirty="0" smtClean="0"/>
-              <a:t> = 2</a:t>
+              <a:t> = 2 / cm^2</a:t>
             </a:r>
           </a:p>
           <a:p>
@@ -3520,7 +3536,7 @@
             </a:r>
             <a:r>
               <a:rPr lang="nl-NL" dirty="0" smtClean="0"/>
-              <a:t>* = 10</a:t>
+              <a:t>* = 10 / cm^2</a:t>
             </a:r>
           </a:p>
           <a:p>
@@ -3556,10 +3572,1993 @@
           </a:p>
         </p:txBody>
       </p:sp>
+      <p:pic>
+        <p:nvPicPr>
+          <p:cNvPr id="6" name="Afbeelding 5"/>
+          <p:cNvPicPr>
+            <a:picLocks noChangeAspect="1"/>
+          </p:cNvPicPr>
+          <p:nvPr/>
+        </p:nvPicPr>
+        <p:blipFill>
+          <a:blip r:embed="rId3">
+            <a:extLst>
+              <a:ext uri="{28A0092B-C50C-407E-A947-70E740481C1C}">
+                <a14:useLocalDpi xmlns:a14="http://schemas.microsoft.com/office/drawing/2010/main" val="0"/>
+              </a:ext>
+            </a:extLst>
+          </a:blip>
+          <a:stretch>
+            <a:fillRect/>
+          </a:stretch>
+        </p:blipFill>
+        <p:spPr>
+          <a:xfrm>
+            <a:off x="304800" y="5609024"/>
+            <a:ext cx="5106113" cy="514422"/>
+          </a:xfrm>
+          <a:prstGeom prst="rect">
+            <a:avLst/>
+          </a:prstGeom>
+        </p:spPr>
+      </p:pic>
     </p:spTree>
     <p:extLst>
       <p:ext uri="{BB962C8B-B14F-4D97-AF65-F5344CB8AC3E}">
         <p14:creationId xmlns:p14="http://schemas.microsoft.com/office/powerpoint/2010/main" val="3717564455"/>
+      </p:ext>
+    </p:extLst>
+  </p:cSld>
+  <p:clrMapOvr>
+    <a:masterClrMapping/>
+  </p:clrMapOvr>
+</p:sld>
+</file>
+
+<file path=ppt/slides/slide3.xml><?xml version="1.0" encoding="utf-8"?>
+<p:sld xmlns:a="http://schemas.openxmlformats.org/drawingml/2006/main" xmlns:r="http://schemas.openxmlformats.org/officeDocument/2006/relationships" xmlns:p="http://schemas.openxmlformats.org/presentationml/2006/main">
+  <p:cSld>
+    <p:spTree>
+      <p:nvGrpSpPr>
+        <p:cNvPr id="1" name=""/>
+        <p:cNvGrpSpPr/>
+        <p:nvPr/>
+      </p:nvGrpSpPr>
+      <p:grpSpPr>
+        <a:xfrm>
+          <a:off x="0" y="0"/>
+          <a:ext cx="0" cy="0"/>
+          <a:chOff x="0" y="0"/>
+          <a:chExt cx="0" cy="0"/>
+        </a:xfrm>
+      </p:grpSpPr>
+      <p:sp>
+        <p:nvSpPr>
+          <p:cNvPr id="2" name="Titel 1"/>
+          <p:cNvSpPr>
+            <a:spLocks noGrp="1"/>
+          </p:cNvSpPr>
+          <p:nvPr>
+            <p:ph type="title"/>
+          </p:nvPr>
+        </p:nvSpPr>
+        <p:spPr/>
+        <p:txBody>
+          <a:bodyPr/>
+          <a:lstStyle/>
+          <a:p>
+            <a:endParaRPr lang="nl-NL"/>
+          </a:p>
+        </p:txBody>
+      </p:sp>
+      <p:pic>
+        <p:nvPicPr>
+          <p:cNvPr id="5" name="Tijdelijke aanduiding voor inhoud 4"/>
+          <p:cNvPicPr>
+            <a:picLocks noGrp="1" noChangeAspect="1"/>
+          </p:cNvPicPr>
+          <p:nvPr>
+            <p:ph idx="1"/>
+          </p:nvPr>
+        </p:nvPicPr>
+        <p:blipFill>
+          <a:blip r:embed="rId2">
+            <a:extLst>
+              <a:ext uri="{28A0092B-C50C-407E-A947-70E740481C1C}">
+                <a14:useLocalDpi xmlns:a14="http://schemas.microsoft.com/office/drawing/2010/main" val="0"/>
+              </a:ext>
+            </a:extLst>
+          </a:blip>
+          <a:stretch>
+            <a:fillRect/>
+          </a:stretch>
+        </p:blipFill>
+        <p:spPr>
+          <a:xfrm>
+            <a:off x="-6927" y="1219200"/>
+            <a:ext cx="5417127" cy="4028988"/>
+          </a:xfrm>
+        </p:spPr>
+      </p:pic>
+      <p:sp>
+        <p:nvSpPr>
+          <p:cNvPr id="4" name="Tijdelijke aanduiding voor inhoud 2"/>
+          <p:cNvSpPr txBox="1">
+            <a:spLocks/>
+          </p:cNvSpPr>
+          <p:nvPr/>
+        </p:nvSpPr>
+        <p:spPr>
+          <a:xfrm>
+            <a:off x="5410200" y="1600200"/>
+            <a:ext cx="3505200" cy="4525963"/>
+          </a:xfrm>
+          <a:prstGeom prst="rect">
+            <a:avLst/>
+          </a:prstGeom>
+        </p:spPr>
+        <p:txBody>
+          <a:bodyPr vert="horz" lIns="91440" tIns="45720" rIns="91440" bIns="45720" rtlCol="0">
+            <a:normAutofit/>
+          </a:bodyPr>
+          <a:lstStyle>
+            <a:lvl1pPr marL="342900" indent="-342900" algn="l" defTabSz="914400" rtl="0" eaLnBrk="1" latinLnBrk="0" hangingPunct="1">
+              <a:spcBef>
+                <a:spcPct val="20000"/>
+              </a:spcBef>
+              <a:buFont typeface="Arial" panose="020B0604020202020204" pitchFamily="34" charset="0"/>
+              <a:buChar char="•"/>
+              <a:defRPr sz="3200" kern="1200">
+                <a:solidFill>
+                  <a:schemeClr val="tx1"/>
+                </a:solidFill>
+                <a:latin typeface="+mn-lt"/>
+                <a:ea typeface="+mn-ea"/>
+                <a:cs typeface="+mn-cs"/>
+              </a:defRPr>
+            </a:lvl1pPr>
+            <a:lvl2pPr marL="742950" indent="-285750" algn="l" defTabSz="914400" rtl="0" eaLnBrk="1" latinLnBrk="0" hangingPunct="1">
+              <a:spcBef>
+                <a:spcPct val="20000"/>
+              </a:spcBef>
+              <a:buFont typeface="Arial" panose="020B0604020202020204" pitchFamily="34" charset="0"/>
+              <a:buChar char="–"/>
+              <a:defRPr sz="2800" kern="1200">
+                <a:solidFill>
+                  <a:schemeClr val="tx1"/>
+                </a:solidFill>
+                <a:latin typeface="+mn-lt"/>
+                <a:ea typeface="+mn-ea"/>
+                <a:cs typeface="+mn-cs"/>
+              </a:defRPr>
+            </a:lvl2pPr>
+            <a:lvl3pPr marL="1143000" indent="-228600" algn="l" defTabSz="914400" rtl="0" eaLnBrk="1" latinLnBrk="0" hangingPunct="1">
+              <a:spcBef>
+                <a:spcPct val="20000"/>
+              </a:spcBef>
+              <a:buFont typeface="Arial" panose="020B0604020202020204" pitchFamily="34" charset="0"/>
+              <a:buChar char="•"/>
+              <a:defRPr sz="2400" kern="1200">
+                <a:solidFill>
+                  <a:schemeClr val="tx1"/>
+                </a:solidFill>
+                <a:latin typeface="+mn-lt"/>
+                <a:ea typeface="+mn-ea"/>
+                <a:cs typeface="+mn-cs"/>
+              </a:defRPr>
+            </a:lvl3pPr>
+            <a:lvl4pPr marL="1600200" indent="-228600" algn="l" defTabSz="914400" rtl="0" eaLnBrk="1" latinLnBrk="0" hangingPunct="1">
+              <a:spcBef>
+                <a:spcPct val="20000"/>
+              </a:spcBef>
+              <a:buFont typeface="Arial" panose="020B0604020202020204" pitchFamily="34" charset="0"/>
+              <a:buChar char="–"/>
+              <a:defRPr sz="2000" kern="1200">
+                <a:solidFill>
+                  <a:schemeClr val="tx1"/>
+                </a:solidFill>
+                <a:latin typeface="+mn-lt"/>
+                <a:ea typeface="+mn-ea"/>
+                <a:cs typeface="+mn-cs"/>
+              </a:defRPr>
+            </a:lvl4pPr>
+            <a:lvl5pPr marL="2057400" indent="-228600" algn="l" defTabSz="914400" rtl="0" eaLnBrk="1" latinLnBrk="0" hangingPunct="1">
+              <a:spcBef>
+                <a:spcPct val="20000"/>
+              </a:spcBef>
+              <a:buFont typeface="Arial" panose="020B0604020202020204" pitchFamily="34" charset="0"/>
+              <a:buChar char="»"/>
+              <a:defRPr sz="2000" kern="1200">
+                <a:solidFill>
+                  <a:schemeClr val="tx1"/>
+                </a:solidFill>
+                <a:latin typeface="+mn-lt"/>
+                <a:ea typeface="+mn-ea"/>
+                <a:cs typeface="+mn-cs"/>
+              </a:defRPr>
+            </a:lvl5pPr>
+            <a:lvl6pPr marL="2514600" indent="-228600" algn="l" defTabSz="914400" rtl="0" eaLnBrk="1" latinLnBrk="0" hangingPunct="1">
+              <a:spcBef>
+                <a:spcPct val="20000"/>
+              </a:spcBef>
+              <a:buFont typeface="Arial" panose="020B0604020202020204" pitchFamily="34" charset="0"/>
+              <a:buChar char="•"/>
+              <a:defRPr sz="2000" kern="1200">
+                <a:solidFill>
+                  <a:schemeClr val="tx1"/>
+                </a:solidFill>
+                <a:latin typeface="+mn-lt"/>
+                <a:ea typeface="+mn-ea"/>
+                <a:cs typeface="+mn-cs"/>
+              </a:defRPr>
+            </a:lvl6pPr>
+            <a:lvl7pPr marL="2971800" indent="-228600" algn="l" defTabSz="914400" rtl="0" eaLnBrk="1" latinLnBrk="0" hangingPunct="1">
+              <a:spcBef>
+                <a:spcPct val="20000"/>
+              </a:spcBef>
+              <a:buFont typeface="Arial" panose="020B0604020202020204" pitchFamily="34" charset="0"/>
+              <a:buChar char="•"/>
+              <a:defRPr sz="2000" kern="1200">
+                <a:solidFill>
+                  <a:schemeClr val="tx1"/>
+                </a:solidFill>
+                <a:latin typeface="+mn-lt"/>
+                <a:ea typeface="+mn-ea"/>
+                <a:cs typeface="+mn-cs"/>
+              </a:defRPr>
+            </a:lvl7pPr>
+            <a:lvl8pPr marL="3429000" indent="-228600" algn="l" defTabSz="914400" rtl="0" eaLnBrk="1" latinLnBrk="0" hangingPunct="1">
+              <a:spcBef>
+                <a:spcPct val="20000"/>
+              </a:spcBef>
+              <a:buFont typeface="Arial" panose="020B0604020202020204" pitchFamily="34" charset="0"/>
+              <a:buChar char="•"/>
+              <a:defRPr sz="2000" kern="1200">
+                <a:solidFill>
+                  <a:schemeClr val="tx1"/>
+                </a:solidFill>
+                <a:latin typeface="+mn-lt"/>
+                <a:ea typeface="+mn-ea"/>
+                <a:cs typeface="+mn-cs"/>
+              </a:defRPr>
+            </a:lvl8pPr>
+            <a:lvl9pPr marL="3886200" indent="-228600" algn="l" defTabSz="914400" rtl="0" eaLnBrk="1" latinLnBrk="0" hangingPunct="1">
+              <a:spcBef>
+                <a:spcPct val="20000"/>
+              </a:spcBef>
+              <a:buFont typeface="Arial" panose="020B0604020202020204" pitchFamily="34" charset="0"/>
+              <a:buChar char="•"/>
+              <a:defRPr sz="2000" kern="1200">
+                <a:solidFill>
+                  <a:schemeClr val="tx1"/>
+                </a:solidFill>
+                <a:latin typeface="+mn-lt"/>
+                <a:ea typeface="+mn-ea"/>
+                <a:cs typeface="+mn-cs"/>
+              </a:defRPr>
+            </a:lvl9pPr>
+          </a:lstStyle>
+          <a:p>
+            <a:pPr marL="0" indent="0">
+              <a:buFont typeface="Arial" panose="020B0604020202020204" pitchFamily="34" charset="0"/>
+              <a:buNone/>
+            </a:pPr>
+            <a:r>
+              <a:rPr lang="nl-NL" dirty="0" smtClean="0"/>
+              <a:t>g = 0.8</a:t>
+            </a:r>
+          </a:p>
+          <a:p>
+            <a:pPr marL="0" indent="0">
+              <a:buFont typeface="Arial" panose="020B0604020202020204" pitchFamily="34" charset="0"/>
+              <a:buNone/>
+            </a:pPr>
+            <a:r>
+              <a:rPr lang="nl-NL" dirty="0" err="1" smtClean="0"/>
+              <a:t>mu_a</a:t>
+            </a:r>
+            <a:r>
+              <a:rPr lang="nl-NL" dirty="0" smtClean="0"/>
+              <a:t> = 0.1 / cm^2</a:t>
+            </a:r>
+          </a:p>
+          <a:p>
+            <a:pPr marL="0" indent="0">
+              <a:buFont typeface="Arial" panose="020B0604020202020204" pitchFamily="34" charset="0"/>
+              <a:buNone/>
+            </a:pPr>
+            <a:r>
+              <a:rPr lang="nl-NL" dirty="0" err="1" smtClean="0"/>
+              <a:t>mu_s</a:t>
+            </a:r>
+            <a:r>
+              <a:rPr lang="nl-NL" dirty="0" smtClean="0"/>
+              <a:t>* = 10 / cm^2</a:t>
+            </a:r>
+          </a:p>
+          <a:p>
+            <a:pPr marL="0" indent="0">
+              <a:buFont typeface="Arial" panose="020B0604020202020204" pitchFamily="34" charset="0"/>
+              <a:buNone/>
+            </a:pPr>
+            <a:r>
+              <a:rPr lang="nl-NL" dirty="0" smtClean="0"/>
+              <a:t>Bins = 200</a:t>
+            </a:r>
+          </a:p>
+          <a:p>
+            <a:pPr marL="0" indent="0">
+              <a:buFont typeface="Arial" panose="020B0604020202020204" pitchFamily="34" charset="0"/>
+              <a:buNone/>
+            </a:pPr>
+            <a:r>
+              <a:rPr lang="nl-NL" dirty="0" smtClean="0"/>
+              <a:t>Aantal =</a:t>
+            </a:r>
+          </a:p>
+          <a:p>
+            <a:pPr marL="0" indent="0">
+              <a:buFont typeface="Arial" panose="020B0604020202020204" pitchFamily="34" charset="0"/>
+              <a:buNone/>
+            </a:pPr>
+            <a:r>
+              <a:rPr lang="nl-NL" dirty="0" smtClean="0"/>
+              <a:t>1.000.000</a:t>
+            </a:r>
+            <a:endParaRPr lang="nl-NL" dirty="0"/>
+          </a:p>
+        </p:txBody>
+      </p:sp>
+      <p:pic>
+        <p:nvPicPr>
+          <p:cNvPr id="6" name="Afbeelding 5"/>
+          <p:cNvPicPr>
+            <a:picLocks noChangeAspect="1"/>
+          </p:cNvPicPr>
+          <p:nvPr/>
+        </p:nvPicPr>
+        <p:blipFill>
+          <a:blip r:embed="rId3">
+            <a:extLst>
+              <a:ext uri="{28A0092B-C50C-407E-A947-70E740481C1C}">
+                <a14:useLocalDpi xmlns:a14="http://schemas.microsoft.com/office/drawing/2010/main" val="0"/>
+              </a:ext>
+            </a:extLst>
+          </a:blip>
+          <a:stretch>
+            <a:fillRect/>
+          </a:stretch>
+        </p:blipFill>
+        <p:spPr>
+          <a:xfrm>
+            <a:off x="304800" y="5609024"/>
+            <a:ext cx="5106113" cy="514422"/>
+          </a:xfrm>
+          <a:prstGeom prst="rect">
+            <a:avLst/>
+          </a:prstGeom>
+        </p:spPr>
+      </p:pic>
+    </p:spTree>
+    <p:extLst>
+      <p:ext uri="{BB962C8B-B14F-4D97-AF65-F5344CB8AC3E}">
+        <p14:creationId xmlns:p14="http://schemas.microsoft.com/office/powerpoint/2010/main" val="3167050578"/>
+      </p:ext>
+    </p:extLst>
+  </p:cSld>
+  <p:clrMapOvr>
+    <a:masterClrMapping/>
+  </p:clrMapOvr>
+</p:sld>
+</file>
+
+<file path=ppt/slides/slide4.xml><?xml version="1.0" encoding="utf-8"?>
+<p:sld xmlns:a="http://schemas.openxmlformats.org/drawingml/2006/main" xmlns:r="http://schemas.openxmlformats.org/officeDocument/2006/relationships" xmlns:p="http://schemas.openxmlformats.org/presentationml/2006/main">
+  <p:cSld>
+    <p:spTree>
+      <p:nvGrpSpPr>
+        <p:cNvPr id="1" name=""/>
+        <p:cNvGrpSpPr/>
+        <p:nvPr/>
+      </p:nvGrpSpPr>
+      <p:grpSpPr>
+        <a:xfrm>
+          <a:off x="0" y="0"/>
+          <a:ext cx="0" cy="0"/>
+          <a:chOff x="0" y="0"/>
+          <a:chExt cx="0" cy="0"/>
+        </a:xfrm>
+      </p:grpSpPr>
+      <p:sp>
+        <p:nvSpPr>
+          <p:cNvPr id="4" name="Tijdelijke aanduiding voor inhoud 2"/>
+          <p:cNvSpPr txBox="1">
+            <a:spLocks/>
+          </p:cNvSpPr>
+          <p:nvPr/>
+        </p:nvSpPr>
+        <p:spPr>
+          <a:xfrm>
+            <a:off x="5486400" y="228600"/>
+            <a:ext cx="3657600" cy="6629400"/>
+          </a:xfrm>
+          <a:prstGeom prst="rect">
+            <a:avLst/>
+          </a:prstGeom>
+        </p:spPr>
+        <p:txBody>
+          <a:bodyPr vert="horz" lIns="91440" tIns="45720" rIns="91440" bIns="45720" rtlCol="0">
+            <a:normAutofit/>
+          </a:bodyPr>
+          <a:lstStyle>
+            <a:lvl1pPr marL="342900" indent="-342900" algn="l" defTabSz="914400" rtl="0" eaLnBrk="1" latinLnBrk="0" hangingPunct="1">
+              <a:spcBef>
+                <a:spcPct val="20000"/>
+              </a:spcBef>
+              <a:buFont typeface="Arial" panose="020B0604020202020204" pitchFamily="34" charset="0"/>
+              <a:buChar char="•"/>
+              <a:defRPr sz="3200" kern="1200">
+                <a:solidFill>
+                  <a:schemeClr val="tx1"/>
+                </a:solidFill>
+                <a:latin typeface="+mn-lt"/>
+                <a:ea typeface="+mn-ea"/>
+                <a:cs typeface="+mn-cs"/>
+              </a:defRPr>
+            </a:lvl1pPr>
+            <a:lvl2pPr marL="742950" indent="-285750" algn="l" defTabSz="914400" rtl="0" eaLnBrk="1" latinLnBrk="0" hangingPunct="1">
+              <a:spcBef>
+                <a:spcPct val="20000"/>
+              </a:spcBef>
+              <a:buFont typeface="Arial" panose="020B0604020202020204" pitchFamily="34" charset="0"/>
+              <a:buChar char="–"/>
+              <a:defRPr sz="2800" kern="1200">
+                <a:solidFill>
+                  <a:schemeClr val="tx1"/>
+                </a:solidFill>
+                <a:latin typeface="+mn-lt"/>
+                <a:ea typeface="+mn-ea"/>
+                <a:cs typeface="+mn-cs"/>
+              </a:defRPr>
+            </a:lvl2pPr>
+            <a:lvl3pPr marL="1143000" indent="-228600" algn="l" defTabSz="914400" rtl="0" eaLnBrk="1" latinLnBrk="0" hangingPunct="1">
+              <a:spcBef>
+                <a:spcPct val="20000"/>
+              </a:spcBef>
+              <a:buFont typeface="Arial" panose="020B0604020202020204" pitchFamily="34" charset="0"/>
+              <a:buChar char="•"/>
+              <a:defRPr sz="2400" kern="1200">
+                <a:solidFill>
+                  <a:schemeClr val="tx1"/>
+                </a:solidFill>
+                <a:latin typeface="+mn-lt"/>
+                <a:ea typeface="+mn-ea"/>
+                <a:cs typeface="+mn-cs"/>
+              </a:defRPr>
+            </a:lvl3pPr>
+            <a:lvl4pPr marL="1600200" indent="-228600" algn="l" defTabSz="914400" rtl="0" eaLnBrk="1" latinLnBrk="0" hangingPunct="1">
+              <a:spcBef>
+                <a:spcPct val="20000"/>
+              </a:spcBef>
+              <a:buFont typeface="Arial" panose="020B0604020202020204" pitchFamily="34" charset="0"/>
+              <a:buChar char="–"/>
+              <a:defRPr sz="2000" kern="1200">
+                <a:solidFill>
+                  <a:schemeClr val="tx1"/>
+                </a:solidFill>
+                <a:latin typeface="+mn-lt"/>
+                <a:ea typeface="+mn-ea"/>
+                <a:cs typeface="+mn-cs"/>
+              </a:defRPr>
+            </a:lvl4pPr>
+            <a:lvl5pPr marL="2057400" indent="-228600" algn="l" defTabSz="914400" rtl="0" eaLnBrk="1" latinLnBrk="0" hangingPunct="1">
+              <a:spcBef>
+                <a:spcPct val="20000"/>
+              </a:spcBef>
+              <a:buFont typeface="Arial" panose="020B0604020202020204" pitchFamily="34" charset="0"/>
+              <a:buChar char="»"/>
+              <a:defRPr sz="2000" kern="1200">
+                <a:solidFill>
+                  <a:schemeClr val="tx1"/>
+                </a:solidFill>
+                <a:latin typeface="+mn-lt"/>
+                <a:ea typeface="+mn-ea"/>
+                <a:cs typeface="+mn-cs"/>
+              </a:defRPr>
+            </a:lvl5pPr>
+            <a:lvl6pPr marL="2514600" indent="-228600" algn="l" defTabSz="914400" rtl="0" eaLnBrk="1" latinLnBrk="0" hangingPunct="1">
+              <a:spcBef>
+                <a:spcPct val="20000"/>
+              </a:spcBef>
+              <a:buFont typeface="Arial" panose="020B0604020202020204" pitchFamily="34" charset="0"/>
+              <a:buChar char="•"/>
+              <a:defRPr sz="2000" kern="1200">
+                <a:solidFill>
+                  <a:schemeClr val="tx1"/>
+                </a:solidFill>
+                <a:latin typeface="+mn-lt"/>
+                <a:ea typeface="+mn-ea"/>
+                <a:cs typeface="+mn-cs"/>
+              </a:defRPr>
+            </a:lvl6pPr>
+            <a:lvl7pPr marL="2971800" indent="-228600" algn="l" defTabSz="914400" rtl="0" eaLnBrk="1" latinLnBrk="0" hangingPunct="1">
+              <a:spcBef>
+                <a:spcPct val="20000"/>
+              </a:spcBef>
+              <a:buFont typeface="Arial" panose="020B0604020202020204" pitchFamily="34" charset="0"/>
+              <a:buChar char="•"/>
+              <a:defRPr sz="2000" kern="1200">
+                <a:solidFill>
+                  <a:schemeClr val="tx1"/>
+                </a:solidFill>
+                <a:latin typeface="+mn-lt"/>
+                <a:ea typeface="+mn-ea"/>
+                <a:cs typeface="+mn-cs"/>
+              </a:defRPr>
+            </a:lvl7pPr>
+            <a:lvl8pPr marL="3429000" indent="-228600" algn="l" defTabSz="914400" rtl="0" eaLnBrk="1" latinLnBrk="0" hangingPunct="1">
+              <a:spcBef>
+                <a:spcPct val="20000"/>
+              </a:spcBef>
+              <a:buFont typeface="Arial" panose="020B0604020202020204" pitchFamily="34" charset="0"/>
+              <a:buChar char="•"/>
+              <a:defRPr sz="2000" kern="1200">
+                <a:solidFill>
+                  <a:schemeClr val="tx1"/>
+                </a:solidFill>
+                <a:latin typeface="+mn-lt"/>
+                <a:ea typeface="+mn-ea"/>
+                <a:cs typeface="+mn-cs"/>
+              </a:defRPr>
+            </a:lvl8pPr>
+            <a:lvl9pPr marL="3886200" indent="-228600" algn="l" defTabSz="914400" rtl="0" eaLnBrk="1" latinLnBrk="0" hangingPunct="1">
+              <a:spcBef>
+                <a:spcPct val="20000"/>
+              </a:spcBef>
+              <a:buFont typeface="Arial" panose="020B0604020202020204" pitchFamily="34" charset="0"/>
+              <a:buChar char="•"/>
+              <a:defRPr sz="2000" kern="1200">
+                <a:solidFill>
+                  <a:schemeClr val="tx1"/>
+                </a:solidFill>
+                <a:latin typeface="+mn-lt"/>
+                <a:ea typeface="+mn-ea"/>
+                <a:cs typeface="+mn-cs"/>
+              </a:defRPr>
+            </a:lvl9pPr>
+          </a:lstStyle>
+          <a:p>
+            <a:pPr marL="0" indent="0">
+              <a:buFont typeface="Arial" panose="020B0604020202020204" pitchFamily="34" charset="0"/>
+              <a:buNone/>
+            </a:pPr>
+            <a:r>
+              <a:rPr lang="nl-NL" dirty="0" smtClean="0"/>
+              <a:t>g = 0.8</a:t>
+            </a:r>
+          </a:p>
+          <a:p>
+            <a:pPr marL="0" indent="0">
+              <a:buFont typeface="Arial" panose="020B0604020202020204" pitchFamily="34" charset="0"/>
+              <a:buNone/>
+            </a:pPr>
+            <a:r>
+              <a:rPr lang="nl-NL" dirty="0" err="1" smtClean="0"/>
+              <a:t>mu_s</a:t>
+            </a:r>
+            <a:r>
+              <a:rPr lang="nl-NL" dirty="0" smtClean="0"/>
+              <a:t>* = 10 / cm^2</a:t>
+            </a:r>
+          </a:p>
+          <a:p>
+            <a:pPr marL="0" indent="0">
+              <a:buFont typeface="Arial" panose="020B0604020202020204" pitchFamily="34" charset="0"/>
+              <a:buNone/>
+            </a:pPr>
+            <a:r>
+              <a:rPr lang="nl-NL" dirty="0" smtClean="0"/>
+              <a:t>Bins = 200</a:t>
+            </a:r>
+          </a:p>
+          <a:p>
+            <a:pPr marL="0" indent="0">
+              <a:buFont typeface="Arial" panose="020B0604020202020204" pitchFamily="34" charset="0"/>
+              <a:buNone/>
+            </a:pPr>
+            <a:r>
+              <a:rPr lang="nl-NL" dirty="0" smtClean="0"/>
+              <a:t>Aantal =</a:t>
+            </a:r>
+          </a:p>
+          <a:p>
+            <a:pPr marL="0" indent="0">
+              <a:buFont typeface="Arial" panose="020B0604020202020204" pitchFamily="34" charset="0"/>
+              <a:buNone/>
+            </a:pPr>
+            <a:r>
+              <a:rPr lang="nl-NL" dirty="0" smtClean="0"/>
+              <a:t>1.000.000</a:t>
+            </a:r>
+          </a:p>
+          <a:p>
+            <a:pPr marL="0" indent="0">
+              <a:buFont typeface="Arial" panose="020B0604020202020204" pitchFamily="34" charset="0"/>
+              <a:buNone/>
+            </a:pPr>
+            <a:r>
+              <a:rPr lang="nl-NL" dirty="0" smtClean="0"/>
+              <a:t>blue =&gt;</a:t>
+            </a:r>
+          </a:p>
+          <a:p>
+            <a:pPr marL="0" indent="0">
+              <a:buFont typeface="Arial" panose="020B0604020202020204" pitchFamily="34" charset="0"/>
+              <a:buNone/>
+            </a:pPr>
+            <a:r>
+              <a:rPr lang="nl-NL" dirty="0" err="1" smtClean="0"/>
+              <a:t>mua</a:t>
+            </a:r>
+            <a:r>
+              <a:rPr lang="nl-NL" dirty="0" smtClean="0"/>
+              <a:t> = 0.1 / cm^2</a:t>
+            </a:r>
+          </a:p>
+          <a:p>
+            <a:pPr marL="0" indent="0">
+              <a:buFont typeface="Arial" panose="020B0604020202020204" pitchFamily="34" charset="0"/>
+              <a:buNone/>
+            </a:pPr>
+            <a:r>
+              <a:rPr lang="nl-NL" dirty="0" smtClean="0"/>
+              <a:t>green =&gt;</a:t>
+            </a:r>
+          </a:p>
+          <a:p>
+            <a:pPr marL="0" indent="0">
+              <a:buFont typeface="Arial" panose="020B0604020202020204" pitchFamily="34" charset="0"/>
+              <a:buNone/>
+            </a:pPr>
+            <a:r>
+              <a:rPr lang="nl-NL" dirty="0" err="1" smtClean="0"/>
+              <a:t>mua</a:t>
+            </a:r>
+            <a:r>
+              <a:rPr lang="nl-NL" dirty="0" smtClean="0"/>
+              <a:t> = 1 / cm^2</a:t>
+            </a:r>
+          </a:p>
+          <a:p>
+            <a:pPr marL="0" indent="0">
+              <a:buFont typeface="Arial" panose="020B0604020202020204" pitchFamily="34" charset="0"/>
+              <a:buNone/>
+            </a:pPr>
+            <a:r>
+              <a:rPr lang="nl-NL" dirty="0" smtClean="0"/>
+              <a:t>red =&gt;</a:t>
+            </a:r>
+          </a:p>
+          <a:p>
+            <a:pPr marL="0" indent="0">
+              <a:buFont typeface="Arial" panose="020B0604020202020204" pitchFamily="34" charset="0"/>
+              <a:buNone/>
+            </a:pPr>
+            <a:r>
+              <a:rPr lang="nl-NL" dirty="0" err="1" smtClean="0"/>
+              <a:t>mua</a:t>
+            </a:r>
+            <a:r>
+              <a:rPr lang="nl-NL" dirty="0" smtClean="0"/>
+              <a:t> = 2 / cm^2</a:t>
+            </a:r>
+            <a:endParaRPr lang="nl-NL" dirty="0"/>
+          </a:p>
+        </p:txBody>
+      </p:sp>
+      <p:pic>
+        <p:nvPicPr>
+          <p:cNvPr id="5" name="Afbeelding 4"/>
+          <p:cNvPicPr>
+            <a:picLocks noChangeAspect="1"/>
+          </p:cNvPicPr>
+          <p:nvPr/>
+        </p:nvPicPr>
+        <p:blipFill>
+          <a:blip r:embed="rId2">
+            <a:extLst>
+              <a:ext uri="{28A0092B-C50C-407E-A947-70E740481C1C}">
+                <a14:useLocalDpi xmlns:a14="http://schemas.microsoft.com/office/drawing/2010/main" val="0"/>
+              </a:ext>
+            </a:extLst>
+          </a:blip>
+          <a:stretch>
+            <a:fillRect/>
+          </a:stretch>
+        </p:blipFill>
+        <p:spPr>
+          <a:xfrm>
+            <a:off x="0" y="914401"/>
+            <a:ext cx="5122689" cy="3810000"/>
+          </a:xfrm>
+          <a:prstGeom prst="rect">
+            <a:avLst/>
+          </a:prstGeom>
+        </p:spPr>
+      </p:pic>
+    </p:spTree>
+    <p:extLst>
+      <p:ext uri="{BB962C8B-B14F-4D97-AF65-F5344CB8AC3E}">
+        <p14:creationId xmlns:p14="http://schemas.microsoft.com/office/powerpoint/2010/main" val="3295305734"/>
+      </p:ext>
+    </p:extLst>
+  </p:cSld>
+  <p:clrMapOvr>
+    <a:masterClrMapping/>
+  </p:clrMapOvr>
+</p:sld>
+</file>
+
+<file path=ppt/slides/slide5.xml><?xml version="1.0" encoding="utf-8"?>
+<p:sld xmlns:a="http://schemas.openxmlformats.org/drawingml/2006/main" xmlns:r="http://schemas.openxmlformats.org/officeDocument/2006/relationships" xmlns:p="http://schemas.openxmlformats.org/presentationml/2006/main">
+  <p:cSld>
+    <p:spTree>
+      <p:nvGrpSpPr>
+        <p:cNvPr id="1" name=""/>
+        <p:cNvGrpSpPr/>
+        <p:nvPr/>
+      </p:nvGrpSpPr>
+      <p:grpSpPr>
+        <a:xfrm>
+          <a:off x="0" y="0"/>
+          <a:ext cx="0" cy="0"/>
+          <a:chOff x="0" y="0"/>
+          <a:chExt cx="0" cy="0"/>
+        </a:xfrm>
+      </p:grpSpPr>
+      <p:sp>
+        <p:nvSpPr>
+          <p:cNvPr id="2" name="Titel 1"/>
+          <p:cNvSpPr>
+            <a:spLocks noGrp="1"/>
+          </p:cNvSpPr>
+          <p:nvPr>
+            <p:ph type="title"/>
+          </p:nvPr>
+        </p:nvSpPr>
+        <p:spPr/>
+        <p:txBody>
+          <a:bodyPr/>
+          <a:lstStyle/>
+          <a:p>
+            <a:endParaRPr lang="nl-NL"/>
+          </a:p>
+        </p:txBody>
+      </p:sp>
+      <p:sp>
+        <p:nvSpPr>
+          <p:cNvPr id="4" name="Tijdelijke aanduiding voor inhoud 2"/>
+          <p:cNvSpPr txBox="1">
+            <a:spLocks noGrp="1"/>
+          </p:cNvSpPr>
+          <p:nvPr>
+            <p:ph idx="1"/>
+          </p:nvPr>
+        </p:nvSpPr>
+        <p:spPr>
+          <a:xfrm>
+            <a:off x="4876800" y="1752600"/>
+            <a:ext cx="4114800" cy="4525963"/>
+          </a:xfrm>
+          <a:prstGeom prst="rect">
+            <a:avLst/>
+          </a:prstGeom>
+        </p:spPr>
+        <p:txBody>
+          <a:bodyPr vert="horz" lIns="91440" tIns="45720" rIns="91440" bIns="45720" rtlCol="0">
+            <a:normAutofit/>
+          </a:bodyPr>
+          <a:lstStyle>
+            <a:lvl1pPr marL="342900" indent="-342900" algn="l" defTabSz="914400" rtl="0" eaLnBrk="1" latinLnBrk="0" hangingPunct="1">
+              <a:spcBef>
+                <a:spcPct val="20000"/>
+              </a:spcBef>
+              <a:buFont typeface="Arial" panose="020B0604020202020204" pitchFamily="34" charset="0"/>
+              <a:buChar char="•"/>
+              <a:defRPr sz="3200" kern="1200">
+                <a:solidFill>
+                  <a:schemeClr val="tx1"/>
+                </a:solidFill>
+                <a:latin typeface="+mn-lt"/>
+                <a:ea typeface="+mn-ea"/>
+                <a:cs typeface="+mn-cs"/>
+              </a:defRPr>
+            </a:lvl1pPr>
+            <a:lvl2pPr marL="742950" indent="-285750" algn="l" defTabSz="914400" rtl="0" eaLnBrk="1" latinLnBrk="0" hangingPunct="1">
+              <a:spcBef>
+                <a:spcPct val="20000"/>
+              </a:spcBef>
+              <a:buFont typeface="Arial" panose="020B0604020202020204" pitchFamily="34" charset="0"/>
+              <a:buChar char="–"/>
+              <a:defRPr sz="2800" kern="1200">
+                <a:solidFill>
+                  <a:schemeClr val="tx1"/>
+                </a:solidFill>
+                <a:latin typeface="+mn-lt"/>
+                <a:ea typeface="+mn-ea"/>
+                <a:cs typeface="+mn-cs"/>
+              </a:defRPr>
+            </a:lvl2pPr>
+            <a:lvl3pPr marL="1143000" indent="-228600" algn="l" defTabSz="914400" rtl="0" eaLnBrk="1" latinLnBrk="0" hangingPunct="1">
+              <a:spcBef>
+                <a:spcPct val="20000"/>
+              </a:spcBef>
+              <a:buFont typeface="Arial" panose="020B0604020202020204" pitchFamily="34" charset="0"/>
+              <a:buChar char="•"/>
+              <a:defRPr sz="2400" kern="1200">
+                <a:solidFill>
+                  <a:schemeClr val="tx1"/>
+                </a:solidFill>
+                <a:latin typeface="+mn-lt"/>
+                <a:ea typeface="+mn-ea"/>
+                <a:cs typeface="+mn-cs"/>
+              </a:defRPr>
+            </a:lvl3pPr>
+            <a:lvl4pPr marL="1600200" indent="-228600" algn="l" defTabSz="914400" rtl="0" eaLnBrk="1" latinLnBrk="0" hangingPunct="1">
+              <a:spcBef>
+                <a:spcPct val="20000"/>
+              </a:spcBef>
+              <a:buFont typeface="Arial" panose="020B0604020202020204" pitchFamily="34" charset="0"/>
+              <a:buChar char="–"/>
+              <a:defRPr sz="2000" kern="1200">
+                <a:solidFill>
+                  <a:schemeClr val="tx1"/>
+                </a:solidFill>
+                <a:latin typeface="+mn-lt"/>
+                <a:ea typeface="+mn-ea"/>
+                <a:cs typeface="+mn-cs"/>
+              </a:defRPr>
+            </a:lvl4pPr>
+            <a:lvl5pPr marL="2057400" indent="-228600" algn="l" defTabSz="914400" rtl="0" eaLnBrk="1" latinLnBrk="0" hangingPunct="1">
+              <a:spcBef>
+                <a:spcPct val="20000"/>
+              </a:spcBef>
+              <a:buFont typeface="Arial" panose="020B0604020202020204" pitchFamily="34" charset="0"/>
+              <a:buChar char="»"/>
+              <a:defRPr sz="2000" kern="1200">
+                <a:solidFill>
+                  <a:schemeClr val="tx1"/>
+                </a:solidFill>
+                <a:latin typeface="+mn-lt"/>
+                <a:ea typeface="+mn-ea"/>
+                <a:cs typeface="+mn-cs"/>
+              </a:defRPr>
+            </a:lvl5pPr>
+            <a:lvl6pPr marL="2514600" indent="-228600" algn="l" defTabSz="914400" rtl="0" eaLnBrk="1" latinLnBrk="0" hangingPunct="1">
+              <a:spcBef>
+                <a:spcPct val="20000"/>
+              </a:spcBef>
+              <a:buFont typeface="Arial" panose="020B0604020202020204" pitchFamily="34" charset="0"/>
+              <a:buChar char="•"/>
+              <a:defRPr sz="2000" kern="1200">
+                <a:solidFill>
+                  <a:schemeClr val="tx1"/>
+                </a:solidFill>
+                <a:latin typeface="+mn-lt"/>
+                <a:ea typeface="+mn-ea"/>
+                <a:cs typeface="+mn-cs"/>
+              </a:defRPr>
+            </a:lvl6pPr>
+            <a:lvl7pPr marL="2971800" indent="-228600" algn="l" defTabSz="914400" rtl="0" eaLnBrk="1" latinLnBrk="0" hangingPunct="1">
+              <a:spcBef>
+                <a:spcPct val="20000"/>
+              </a:spcBef>
+              <a:buFont typeface="Arial" panose="020B0604020202020204" pitchFamily="34" charset="0"/>
+              <a:buChar char="•"/>
+              <a:defRPr sz="2000" kern="1200">
+                <a:solidFill>
+                  <a:schemeClr val="tx1"/>
+                </a:solidFill>
+                <a:latin typeface="+mn-lt"/>
+                <a:ea typeface="+mn-ea"/>
+                <a:cs typeface="+mn-cs"/>
+              </a:defRPr>
+            </a:lvl7pPr>
+            <a:lvl8pPr marL="3429000" indent="-228600" algn="l" defTabSz="914400" rtl="0" eaLnBrk="1" latinLnBrk="0" hangingPunct="1">
+              <a:spcBef>
+                <a:spcPct val="20000"/>
+              </a:spcBef>
+              <a:buFont typeface="Arial" panose="020B0604020202020204" pitchFamily="34" charset="0"/>
+              <a:buChar char="•"/>
+              <a:defRPr sz="2000" kern="1200">
+                <a:solidFill>
+                  <a:schemeClr val="tx1"/>
+                </a:solidFill>
+                <a:latin typeface="+mn-lt"/>
+                <a:ea typeface="+mn-ea"/>
+                <a:cs typeface="+mn-cs"/>
+              </a:defRPr>
+            </a:lvl8pPr>
+            <a:lvl9pPr marL="3886200" indent="-228600" algn="l" defTabSz="914400" rtl="0" eaLnBrk="1" latinLnBrk="0" hangingPunct="1">
+              <a:spcBef>
+                <a:spcPct val="20000"/>
+              </a:spcBef>
+              <a:buFont typeface="Arial" panose="020B0604020202020204" pitchFamily="34" charset="0"/>
+              <a:buChar char="•"/>
+              <a:defRPr sz="2000" kern="1200">
+                <a:solidFill>
+                  <a:schemeClr val="tx1"/>
+                </a:solidFill>
+                <a:latin typeface="+mn-lt"/>
+                <a:ea typeface="+mn-ea"/>
+                <a:cs typeface="+mn-cs"/>
+              </a:defRPr>
+            </a:lvl9pPr>
+          </a:lstStyle>
+          <a:p>
+            <a:pPr marL="0" indent="0">
+              <a:buFont typeface="Arial" panose="020B0604020202020204" pitchFamily="34" charset="0"/>
+              <a:buNone/>
+            </a:pPr>
+            <a:r>
+              <a:rPr lang="nl-NL" dirty="0" smtClean="0"/>
+              <a:t>g = 0.8</a:t>
+            </a:r>
+          </a:p>
+          <a:p>
+            <a:pPr marL="0" indent="0">
+              <a:buFont typeface="Arial" panose="020B0604020202020204" pitchFamily="34" charset="0"/>
+              <a:buNone/>
+            </a:pPr>
+            <a:r>
+              <a:rPr lang="nl-NL" dirty="0" smtClean="0"/>
+              <a:t>r = 0.2 cm</a:t>
+            </a:r>
+          </a:p>
+          <a:p>
+            <a:pPr marL="0" indent="0">
+              <a:buFont typeface="Arial" panose="020B0604020202020204" pitchFamily="34" charset="0"/>
+              <a:buNone/>
+            </a:pPr>
+            <a:r>
+              <a:rPr lang="nl-NL" dirty="0" err="1" smtClean="0"/>
+              <a:t>mu_s</a:t>
+            </a:r>
+            <a:r>
+              <a:rPr lang="nl-NL" dirty="0" smtClean="0"/>
+              <a:t>* = 10 / cm^2</a:t>
+            </a:r>
+          </a:p>
+          <a:p>
+            <a:pPr marL="0" indent="0">
+              <a:buFont typeface="Arial" panose="020B0604020202020204" pitchFamily="34" charset="0"/>
+              <a:buNone/>
+            </a:pPr>
+            <a:r>
+              <a:rPr lang="nl-NL" dirty="0" smtClean="0"/>
+              <a:t>Aantal = 100.000</a:t>
+            </a:r>
+            <a:endParaRPr lang="nl-NL" dirty="0"/>
+          </a:p>
+        </p:txBody>
+      </p:sp>
+      <p:pic>
+        <p:nvPicPr>
+          <p:cNvPr id="5" name="Afbeelding 4"/>
+          <p:cNvPicPr>
+            <a:picLocks noChangeAspect="1"/>
+          </p:cNvPicPr>
+          <p:nvPr/>
+        </p:nvPicPr>
+        <p:blipFill>
+          <a:blip r:embed="rId2">
+            <a:extLst>
+              <a:ext uri="{28A0092B-C50C-407E-A947-70E740481C1C}">
+                <a14:useLocalDpi xmlns:a14="http://schemas.microsoft.com/office/drawing/2010/main" val="0"/>
+              </a:ext>
+            </a:extLst>
+          </a:blip>
+          <a:stretch>
+            <a:fillRect/>
+          </a:stretch>
+        </p:blipFill>
+        <p:spPr>
+          <a:xfrm>
+            <a:off x="163286" y="36286"/>
+            <a:ext cx="4343400" cy="3230404"/>
+          </a:xfrm>
+          <a:prstGeom prst="rect">
+            <a:avLst/>
+          </a:prstGeom>
+        </p:spPr>
+      </p:pic>
+      <p:pic>
+        <p:nvPicPr>
+          <p:cNvPr id="6" name="Afbeelding 5"/>
+          <p:cNvPicPr>
+            <a:picLocks noChangeAspect="1"/>
+          </p:cNvPicPr>
+          <p:nvPr/>
+        </p:nvPicPr>
+        <p:blipFill>
+          <a:blip r:embed="rId3">
+            <a:extLst>
+              <a:ext uri="{28A0092B-C50C-407E-A947-70E740481C1C}">
+                <a14:useLocalDpi xmlns:a14="http://schemas.microsoft.com/office/drawing/2010/main" val="0"/>
+              </a:ext>
+            </a:extLst>
+          </a:blip>
+          <a:stretch>
+            <a:fillRect/>
+          </a:stretch>
+        </p:blipFill>
+        <p:spPr>
+          <a:xfrm>
+            <a:off x="195943" y="3266690"/>
+            <a:ext cx="4360438" cy="3243076"/>
+          </a:xfrm>
+          <a:prstGeom prst="rect">
+            <a:avLst/>
+          </a:prstGeom>
+        </p:spPr>
+      </p:pic>
+    </p:spTree>
+    <p:extLst>
+      <p:ext uri="{BB962C8B-B14F-4D97-AF65-F5344CB8AC3E}">
+        <p14:creationId xmlns:p14="http://schemas.microsoft.com/office/powerpoint/2010/main" val="3824790043"/>
+      </p:ext>
+    </p:extLst>
+  </p:cSld>
+  <p:clrMapOvr>
+    <a:masterClrMapping/>
+  </p:clrMapOvr>
+</p:sld>
+</file>
+
+<file path=ppt/slides/slide6.xml><?xml version="1.0" encoding="utf-8"?>
+<p:sld xmlns:a="http://schemas.openxmlformats.org/drawingml/2006/main" xmlns:r="http://schemas.openxmlformats.org/officeDocument/2006/relationships" xmlns:p="http://schemas.openxmlformats.org/presentationml/2006/main">
+  <p:cSld>
+    <p:spTree>
+      <p:nvGrpSpPr>
+        <p:cNvPr id="1" name=""/>
+        <p:cNvGrpSpPr/>
+        <p:nvPr/>
+      </p:nvGrpSpPr>
+      <p:grpSpPr>
+        <a:xfrm>
+          <a:off x="0" y="0"/>
+          <a:ext cx="0" cy="0"/>
+          <a:chOff x="0" y="0"/>
+          <a:chExt cx="0" cy="0"/>
+        </a:xfrm>
+      </p:grpSpPr>
+      <p:sp>
+        <p:nvSpPr>
+          <p:cNvPr id="2" name="Titel 1"/>
+          <p:cNvSpPr>
+            <a:spLocks noGrp="1"/>
+          </p:cNvSpPr>
+          <p:nvPr>
+            <p:ph type="title"/>
+          </p:nvPr>
+        </p:nvSpPr>
+        <p:spPr/>
+        <p:txBody>
+          <a:bodyPr/>
+          <a:lstStyle/>
+          <a:p>
+            <a:endParaRPr lang="nl-NL"/>
+          </a:p>
+        </p:txBody>
+      </p:sp>
+      <p:sp>
+        <p:nvSpPr>
+          <p:cNvPr id="4" name="Tijdelijke aanduiding voor inhoud 2"/>
+          <p:cNvSpPr txBox="1">
+            <a:spLocks noGrp="1"/>
+          </p:cNvSpPr>
+          <p:nvPr>
+            <p:ph idx="1"/>
+          </p:nvPr>
+        </p:nvSpPr>
+        <p:spPr>
+          <a:xfrm>
+            <a:off x="5029200" y="1752600"/>
+            <a:ext cx="3962400" cy="4525963"/>
+          </a:xfrm>
+          <a:prstGeom prst="rect">
+            <a:avLst/>
+          </a:prstGeom>
+        </p:spPr>
+        <p:txBody>
+          <a:bodyPr vert="horz" lIns="91440" tIns="45720" rIns="91440" bIns="45720" rtlCol="0">
+            <a:normAutofit/>
+          </a:bodyPr>
+          <a:lstStyle>
+            <a:lvl1pPr marL="342900" indent="-342900" algn="l" defTabSz="914400" rtl="0" eaLnBrk="1" latinLnBrk="0" hangingPunct="1">
+              <a:spcBef>
+                <a:spcPct val="20000"/>
+              </a:spcBef>
+              <a:buFont typeface="Arial" panose="020B0604020202020204" pitchFamily="34" charset="0"/>
+              <a:buChar char="•"/>
+              <a:defRPr sz="3200" kern="1200">
+                <a:solidFill>
+                  <a:schemeClr val="tx1"/>
+                </a:solidFill>
+                <a:latin typeface="+mn-lt"/>
+                <a:ea typeface="+mn-ea"/>
+                <a:cs typeface="+mn-cs"/>
+              </a:defRPr>
+            </a:lvl1pPr>
+            <a:lvl2pPr marL="742950" indent="-285750" algn="l" defTabSz="914400" rtl="0" eaLnBrk="1" latinLnBrk="0" hangingPunct="1">
+              <a:spcBef>
+                <a:spcPct val="20000"/>
+              </a:spcBef>
+              <a:buFont typeface="Arial" panose="020B0604020202020204" pitchFamily="34" charset="0"/>
+              <a:buChar char="–"/>
+              <a:defRPr sz="2800" kern="1200">
+                <a:solidFill>
+                  <a:schemeClr val="tx1"/>
+                </a:solidFill>
+                <a:latin typeface="+mn-lt"/>
+                <a:ea typeface="+mn-ea"/>
+                <a:cs typeface="+mn-cs"/>
+              </a:defRPr>
+            </a:lvl2pPr>
+            <a:lvl3pPr marL="1143000" indent="-228600" algn="l" defTabSz="914400" rtl="0" eaLnBrk="1" latinLnBrk="0" hangingPunct="1">
+              <a:spcBef>
+                <a:spcPct val="20000"/>
+              </a:spcBef>
+              <a:buFont typeface="Arial" panose="020B0604020202020204" pitchFamily="34" charset="0"/>
+              <a:buChar char="•"/>
+              <a:defRPr sz="2400" kern="1200">
+                <a:solidFill>
+                  <a:schemeClr val="tx1"/>
+                </a:solidFill>
+                <a:latin typeface="+mn-lt"/>
+                <a:ea typeface="+mn-ea"/>
+                <a:cs typeface="+mn-cs"/>
+              </a:defRPr>
+            </a:lvl3pPr>
+            <a:lvl4pPr marL="1600200" indent="-228600" algn="l" defTabSz="914400" rtl="0" eaLnBrk="1" latinLnBrk="0" hangingPunct="1">
+              <a:spcBef>
+                <a:spcPct val="20000"/>
+              </a:spcBef>
+              <a:buFont typeface="Arial" panose="020B0604020202020204" pitchFamily="34" charset="0"/>
+              <a:buChar char="–"/>
+              <a:defRPr sz="2000" kern="1200">
+                <a:solidFill>
+                  <a:schemeClr val="tx1"/>
+                </a:solidFill>
+                <a:latin typeface="+mn-lt"/>
+                <a:ea typeface="+mn-ea"/>
+                <a:cs typeface="+mn-cs"/>
+              </a:defRPr>
+            </a:lvl4pPr>
+            <a:lvl5pPr marL="2057400" indent="-228600" algn="l" defTabSz="914400" rtl="0" eaLnBrk="1" latinLnBrk="0" hangingPunct="1">
+              <a:spcBef>
+                <a:spcPct val="20000"/>
+              </a:spcBef>
+              <a:buFont typeface="Arial" panose="020B0604020202020204" pitchFamily="34" charset="0"/>
+              <a:buChar char="»"/>
+              <a:defRPr sz="2000" kern="1200">
+                <a:solidFill>
+                  <a:schemeClr val="tx1"/>
+                </a:solidFill>
+                <a:latin typeface="+mn-lt"/>
+                <a:ea typeface="+mn-ea"/>
+                <a:cs typeface="+mn-cs"/>
+              </a:defRPr>
+            </a:lvl5pPr>
+            <a:lvl6pPr marL="2514600" indent="-228600" algn="l" defTabSz="914400" rtl="0" eaLnBrk="1" latinLnBrk="0" hangingPunct="1">
+              <a:spcBef>
+                <a:spcPct val="20000"/>
+              </a:spcBef>
+              <a:buFont typeface="Arial" panose="020B0604020202020204" pitchFamily="34" charset="0"/>
+              <a:buChar char="•"/>
+              <a:defRPr sz="2000" kern="1200">
+                <a:solidFill>
+                  <a:schemeClr val="tx1"/>
+                </a:solidFill>
+                <a:latin typeface="+mn-lt"/>
+                <a:ea typeface="+mn-ea"/>
+                <a:cs typeface="+mn-cs"/>
+              </a:defRPr>
+            </a:lvl6pPr>
+            <a:lvl7pPr marL="2971800" indent="-228600" algn="l" defTabSz="914400" rtl="0" eaLnBrk="1" latinLnBrk="0" hangingPunct="1">
+              <a:spcBef>
+                <a:spcPct val="20000"/>
+              </a:spcBef>
+              <a:buFont typeface="Arial" panose="020B0604020202020204" pitchFamily="34" charset="0"/>
+              <a:buChar char="•"/>
+              <a:defRPr sz="2000" kern="1200">
+                <a:solidFill>
+                  <a:schemeClr val="tx1"/>
+                </a:solidFill>
+                <a:latin typeface="+mn-lt"/>
+                <a:ea typeface="+mn-ea"/>
+                <a:cs typeface="+mn-cs"/>
+              </a:defRPr>
+            </a:lvl7pPr>
+            <a:lvl8pPr marL="3429000" indent="-228600" algn="l" defTabSz="914400" rtl="0" eaLnBrk="1" latinLnBrk="0" hangingPunct="1">
+              <a:spcBef>
+                <a:spcPct val="20000"/>
+              </a:spcBef>
+              <a:buFont typeface="Arial" panose="020B0604020202020204" pitchFamily="34" charset="0"/>
+              <a:buChar char="•"/>
+              <a:defRPr sz="2000" kern="1200">
+                <a:solidFill>
+                  <a:schemeClr val="tx1"/>
+                </a:solidFill>
+                <a:latin typeface="+mn-lt"/>
+                <a:ea typeface="+mn-ea"/>
+                <a:cs typeface="+mn-cs"/>
+              </a:defRPr>
+            </a:lvl8pPr>
+            <a:lvl9pPr marL="3886200" indent="-228600" algn="l" defTabSz="914400" rtl="0" eaLnBrk="1" latinLnBrk="0" hangingPunct="1">
+              <a:spcBef>
+                <a:spcPct val="20000"/>
+              </a:spcBef>
+              <a:buFont typeface="Arial" panose="020B0604020202020204" pitchFamily="34" charset="0"/>
+              <a:buChar char="•"/>
+              <a:defRPr sz="2000" kern="1200">
+                <a:solidFill>
+                  <a:schemeClr val="tx1"/>
+                </a:solidFill>
+                <a:latin typeface="+mn-lt"/>
+                <a:ea typeface="+mn-ea"/>
+                <a:cs typeface="+mn-cs"/>
+              </a:defRPr>
+            </a:lvl9pPr>
+          </a:lstStyle>
+          <a:p>
+            <a:pPr marL="0" indent="0">
+              <a:buFont typeface="Arial" panose="020B0604020202020204" pitchFamily="34" charset="0"/>
+              <a:buNone/>
+            </a:pPr>
+            <a:r>
+              <a:rPr lang="nl-NL" dirty="0" smtClean="0"/>
+              <a:t>g = 0.8</a:t>
+            </a:r>
+          </a:p>
+          <a:p>
+            <a:pPr marL="0" indent="0">
+              <a:buFont typeface="Arial" panose="020B0604020202020204" pitchFamily="34" charset="0"/>
+              <a:buNone/>
+            </a:pPr>
+            <a:r>
+              <a:rPr lang="nl-NL" dirty="0" smtClean="0"/>
+              <a:t>r = 0.3 cm</a:t>
+            </a:r>
+          </a:p>
+          <a:p>
+            <a:pPr marL="0" indent="0">
+              <a:buFont typeface="Arial" panose="020B0604020202020204" pitchFamily="34" charset="0"/>
+              <a:buNone/>
+            </a:pPr>
+            <a:r>
+              <a:rPr lang="nl-NL" dirty="0" err="1" smtClean="0"/>
+              <a:t>mu_s</a:t>
+            </a:r>
+            <a:r>
+              <a:rPr lang="nl-NL" dirty="0" smtClean="0"/>
+              <a:t>* = 10 / cm^2</a:t>
+            </a:r>
+          </a:p>
+          <a:p>
+            <a:pPr marL="0" indent="0">
+              <a:buFont typeface="Arial" panose="020B0604020202020204" pitchFamily="34" charset="0"/>
+              <a:buNone/>
+            </a:pPr>
+            <a:r>
+              <a:rPr lang="nl-NL" dirty="0" smtClean="0"/>
+              <a:t>Aantal = 200.000</a:t>
+            </a:r>
+            <a:endParaRPr lang="nl-NL" dirty="0"/>
+          </a:p>
+        </p:txBody>
+      </p:sp>
+      <p:pic>
+        <p:nvPicPr>
+          <p:cNvPr id="3" name="Afbeelding 2"/>
+          <p:cNvPicPr>
+            <a:picLocks noChangeAspect="1"/>
+          </p:cNvPicPr>
+          <p:nvPr/>
+        </p:nvPicPr>
+        <p:blipFill>
+          <a:blip r:embed="rId2">
+            <a:extLst>
+              <a:ext uri="{28A0092B-C50C-407E-A947-70E740481C1C}">
+                <a14:useLocalDpi xmlns:a14="http://schemas.microsoft.com/office/drawing/2010/main" val="0"/>
+              </a:ext>
+            </a:extLst>
+          </a:blip>
+          <a:stretch>
+            <a:fillRect/>
+          </a:stretch>
+        </p:blipFill>
+        <p:spPr>
+          <a:xfrm>
+            <a:off x="251457" y="3429000"/>
+            <a:ext cx="4373886" cy="3253078"/>
+          </a:xfrm>
+          <a:prstGeom prst="rect">
+            <a:avLst/>
+          </a:prstGeom>
+        </p:spPr>
+      </p:pic>
+      <p:pic>
+        <p:nvPicPr>
+          <p:cNvPr id="7" name="Afbeelding 6"/>
+          <p:cNvPicPr>
+            <a:picLocks noChangeAspect="1"/>
+          </p:cNvPicPr>
+          <p:nvPr/>
+        </p:nvPicPr>
+        <p:blipFill>
+          <a:blip r:embed="rId3">
+            <a:extLst>
+              <a:ext uri="{28A0092B-C50C-407E-A947-70E740481C1C}">
+                <a14:useLocalDpi xmlns:a14="http://schemas.microsoft.com/office/drawing/2010/main" val="0"/>
+              </a:ext>
+            </a:extLst>
+          </a:blip>
+          <a:stretch>
+            <a:fillRect/>
+          </a:stretch>
+        </p:blipFill>
+        <p:spPr>
+          <a:xfrm>
+            <a:off x="219830" y="152400"/>
+            <a:ext cx="4405513" cy="3276600"/>
+          </a:xfrm>
+          <a:prstGeom prst="rect">
+            <a:avLst/>
+          </a:prstGeom>
+        </p:spPr>
+      </p:pic>
+    </p:spTree>
+    <p:extLst>
+      <p:ext uri="{BB962C8B-B14F-4D97-AF65-F5344CB8AC3E}">
+        <p14:creationId xmlns:p14="http://schemas.microsoft.com/office/powerpoint/2010/main" val="45377841"/>
+      </p:ext>
+    </p:extLst>
+  </p:cSld>
+  <p:clrMapOvr>
+    <a:masterClrMapping/>
+  </p:clrMapOvr>
+</p:sld>
+</file>
+
+<file path=ppt/slides/slide7.xml><?xml version="1.0" encoding="utf-8"?>
+<p:sld xmlns:a="http://schemas.openxmlformats.org/drawingml/2006/main" xmlns:r="http://schemas.openxmlformats.org/officeDocument/2006/relationships" xmlns:p="http://schemas.openxmlformats.org/presentationml/2006/main">
+  <p:cSld>
+    <p:spTree>
+      <p:nvGrpSpPr>
+        <p:cNvPr id="1" name=""/>
+        <p:cNvGrpSpPr/>
+        <p:nvPr/>
+      </p:nvGrpSpPr>
+      <p:grpSpPr>
+        <a:xfrm>
+          <a:off x="0" y="0"/>
+          <a:ext cx="0" cy="0"/>
+          <a:chOff x="0" y="0"/>
+          <a:chExt cx="0" cy="0"/>
+        </a:xfrm>
+      </p:grpSpPr>
+      <p:sp>
+        <p:nvSpPr>
+          <p:cNvPr id="2" name="Titel 1"/>
+          <p:cNvSpPr>
+            <a:spLocks noGrp="1"/>
+          </p:cNvSpPr>
+          <p:nvPr>
+            <p:ph type="title"/>
+          </p:nvPr>
+        </p:nvSpPr>
+        <p:spPr/>
+        <p:txBody>
+          <a:bodyPr/>
+          <a:lstStyle/>
+          <a:p>
+            <a:endParaRPr lang="nl-NL"/>
+          </a:p>
+        </p:txBody>
+      </p:sp>
+      <p:sp>
+        <p:nvSpPr>
+          <p:cNvPr id="4" name="Tijdelijke aanduiding voor inhoud 2"/>
+          <p:cNvSpPr txBox="1">
+            <a:spLocks noGrp="1"/>
+          </p:cNvSpPr>
+          <p:nvPr>
+            <p:ph idx="1"/>
+          </p:nvPr>
+        </p:nvSpPr>
+        <p:spPr>
+          <a:xfrm>
+            <a:off x="5334000" y="1752600"/>
+            <a:ext cx="3657600" cy="4525963"/>
+          </a:xfrm>
+          <a:prstGeom prst="rect">
+            <a:avLst/>
+          </a:prstGeom>
+        </p:spPr>
+        <p:txBody>
+          <a:bodyPr vert="horz" lIns="91440" tIns="45720" rIns="91440" bIns="45720" rtlCol="0">
+            <a:normAutofit/>
+          </a:bodyPr>
+          <a:lstStyle>
+            <a:lvl1pPr marL="342900" indent="-342900" algn="l" defTabSz="914400" rtl="0" eaLnBrk="1" latinLnBrk="0" hangingPunct="1">
+              <a:spcBef>
+                <a:spcPct val="20000"/>
+              </a:spcBef>
+              <a:buFont typeface="Arial" panose="020B0604020202020204" pitchFamily="34" charset="0"/>
+              <a:buChar char="•"/>
+              <a:defRPr sz="3200" kern="1200">
+                <a:solidFill>
+                  <a:schemeClr val="tx1"/>
+                </a:solidFill>
+                <a:latin typeface="+mn-lt"/>
+                <a:ea typeface="+mn-ea"/>
+                <a:cs typeface="+mn-cs"/>
+              </a:defRPr>
+            </a:lvl1pPr>
+            <a:lvl2pPr marL="742950" indent="-285750" algn="l" defTabSz="914400" rtl="0" eaLnBrk="1" latinLnBrk="0" hangingPunct="1">
+              <a:spcBef>
+                <a:spcPct val="20000"/>
+              </a:spcBef>
+              <a:buFont typeface="Arial" panose="020B0604020202020204" pitchFamily="34" charset="0"/>
+              <a:buChar char="–"/>
+              <a:defRPr sz="2800" kern="1200">
+                <a:solidFill>
+                  <a:schemeClr val="tx1"/>
+                </a:solidFill>
+                <a:latin typeface="+mn-lt"/>
+                <a:ea typeface="+mn-ea"/>
+                <a:cs typeface="+mn-cs"/>
+              </a:defRPr>
+            </a:lvl2pPr>
+            <a:lvl3pPr marL="1143000" indent="-228600" algn="l" defTabSz="914400" rtl="0" eaLnBrk="1" latinLnBrk="0" hangingPunct="1">
+              <a:spcBef>
+                <a:spcPct val="20000"/>
+              </a:spcBef>
+              <a:buFont typeface="Arial" panose="020B0604020202020204" pitchFamily="34" charset="0"/>
+              <a:buChar char="•"/>
+              <a:defRPr sz="2400" kern="1200">
+                <a:solidFill>
+                  <a:schemeClr val="tx1"/>
+                </a:solidFill>
+                <a:latin typeface="+mn-lt"/>
+                <a:ea typeface="+mn-ea"/>
+                <a:cs typeface="+mn-cs"/>
+              </a:defRPr>
+            </a:lvl3pPr>
+            <a:lvl4pPr marL="1600200" indent="-228600" algn="l" defTabSz="914400" rtl="0" eaLnBrk="1" latinLnBrk="0" hangingPunct="1">
+              <a:spcBef>
+                <a:spcPct val="20000"/>
+              </a:spcBef>
+              <a:buFont typeface="Arial" panose="020B0604020202020204" pitchFamily="34" charset="0"/>
+              <a:buChar char="–"/>
+              <a:defRPr sz="2000" kern="1200">
+                <a:solidFill>
+                  <a:schemeClr val="tx1"/>
+                </a:solidFill>
+                <a:latin typeface="+mn-lt"/>
+                <a:ea typeface="+mn-ea"/>
+                <a:cs typeface="+mn-cs"/>
+              </a:defRPr>
+            </a:lvl4pPr>
+            <a:lvl5pPr marL="2057400" indent="-228600" algn="l" defTabSz="914400" rtl="0" eaLnBrk="1" latinLnBrk="0" hangingPunct="1">
+              <a:spcBef>
+                <a:spcPct val="20000"/>
+              </a:spcBef>
+              <a:buFont typeface="Arial" panose="020B0604020202020204" pitchFamily="34" charset="0"/>
+              <a:buChar char="»"/>
+              <a:defRPr sz="2000" kern="1200">
+                <a:solidFill>
+                  <a:schemeClr val="tx1"/>
+                </a:solidFill>
+                <a:latin typeface="+mn-lt"/>
+                <a:ea typeface="+mn-ea"/>
+                <a:cs typeface="+mn-cs"/>
+              </a:defRPr>
+            </a:lvl5pPr>
+            <a:lvl6pPr marL="2514600" indent="-228600" algn="l" defTabSz="914400" rtl="0" eaLnBrk="1" latinLnBrk="0" hangingPunct="1">
+              <a:spcBef>
+                <a:spcPct val="20000"/>
+              </a:spcBef>
+              <a:buFont typeface="Arial" panose="020B0604020202020204" pitchFamily="34" charset="0"/>
+              <a:buChar char="•"/>
+              <a:defRPr sz="2000" kern="1200">
+                <a:solidFill>
+                  <a:schemeClr val="tx1"/>
+                </a:solidFill>
+                <a:latin typeface="+mn-lt"/>
+                <a:ea typeface="+mn-ea"/>
+                <a:cs typeface="+mn-cs"/>
+              </a:defRPr>
+            </a:lvl6pPr>
+            <a:lvl7pPr marL="2971800" indent="-228600" algn="l" defTabSz="914400" rtl="0" eaLnBrk="1" latinLnBrk="0" hangingPunct="1">
+              <a:spcBef>
+                <a:spcPct val="20000"/>
+              </a:spcBef>
+              <a:buFont typeface="Arial" panose="020B0604020202020204" pitchFamily="34" charset="0"/>
+              <a:buChar char="•"/>
+              <a:defRPr sz="2000" kern="1200">
+                <a:solidFill>
+                  <a:schemeClr val="tx1"/>
+                </a:solidFill>
+                <a:latin typeface="+mn-lt"/>
+                <a:ea typeface="+mn-ea"/>
+                <a:cs typeface="+mn-cs"/>
+              </a:defRPr>
+            </a:lvl7pPr>
+            <a:lvl8pPr marL="3429000" indent="-228600" algn="l" defTabSz="914400" rtl="0" eaLnBrk="1" latinLnBrk="0" hangingPunct="1">
+              <a:spcBef>
+                <a:spcPct val="20000"/>
+              </a:spcBef>
+              <a:buFont typeface="Arial" panose="020B0604020202020204" pitchFamily="34" charset="0"/>
+              <a:buChar char="•"/>
+              <a:defRPr sz="2000" kern="1200">
+                <a:solidFill>
+                  <a:schemeClr val="tx1"/>
+                </a:solidFill>
+                <a:latin typeface="+mn-lt"/>
+                <a:ea typeface="+mn-ea"/>
+                <a:cs typeface="+mn-cs"/>
+              </a:defRPr>
+            </a:lvl8pPr>
+            <a:lvl9pPr marL="3886200" indent="-228600" algn="l" defTabSz="914400" rtl="0" eaLnBrk="1" latinLnBrk="0" hangingPunct="1">
+              <a:spcBef>
+                <a:spcPct val="20000"/>
+              </a:spcBef>
+              <a:buFont typeface="Arial" panose="020B0604020202020204" pitchFamily="34" charset="0"/>
+              <a:buChar char="•"/>
+              <a:defRPr sz="2000" kern="1200">
+                <a:solidFill>
+                  <a:schemeClr val="tx1"/>
+                </a:solidFill>
+                <a:latin typeface="+mn-lt"/>
+                <a:ea typeface="+mn-ea"/>
+                <a:cs typeface="+mn-cs"/>
+              </a:defRPr>
+            </a:lvl9pPr>
+          </a:lstStyle>
+          <a:p>
+            <a:pPr marL="0" indent="0">
+              <a:buFont typeface="Arial" panose="020B0604020202020204" pitchFamily="34" charset="0"/>
+              <a:buNone/>
+            </a:pPr>
+            <a:r>
+              <a:rPr lang="nl-NL" dirty="0" smtClean="0"/>
+              <a:t>g = 0.8</a:t>
+            </a:r>
+          </a:p>
+          <a:p>
+            <a:pPr marL="0" indent="0">
+              <a:buFont typeface="Arial" panose="020B0604020202020204" pitchFamily="34" charset="0"/>
+              <a:buNone/>
+            </a:pPr>
+            <a:r>
+              <a:rPr lang="nl-NL" dirty="0" smtClean="0"/>
+              <a:t>r = 0.1 cm</a:t>
+            </a:r>
+          </a:p>
+          <a:p>
+            <a:pPr marL="0" indent="0">
+              <a:buFont typeface="Arial" panose="020B0604020202020204" pitchFamily="34" charset="0"/>
+              <a:buNone/>
+            </a:pPr>
+            <a:r>
+              <a:rPr lang="nl-NL" dirty="0" err="1" smtClean="0"/>
+              <a:t>mu_s</a:t>
+            </a:r>
+            <a:r>
+              <a:rPr lang="nl-NL" dirty="0" smtClean="0"/>
+              <a:t>* = 10 / cm^2</a:t>
+            </a:r>
+          </a:p>
+          <a:p>
+            <a:pPr marL="0" indent="0">
+              <a:buFont typeface="Arial" panose="020B0604020202020204" pitchFamily="34" charset="0"/>
+              <a:buNone/>
+            </a:pPr>
+            <a:r>
+              <a:rPr lang="nl-NL" dirty="0" smtClean="0"/>
+              <a:t>Aantal = 300.000</a:t>
+            </a:r>
+            <a:endParaRPr lang="nl-NL" dirty="0"/>
+          </a:p>
+        </p:txBody>
+      </p:sp>
+      <p:pic>
+        <p:nvPicPr>
+          <p:cNvPr id="5" name="Afbeelding 4"/>
+          <p:cNvPicPr>
+            <a:picLocks noChangeAspect="1"/>
+          </p:cNvPicPr>
+          <p:nvPr/>
+        </p:nvPicPr>
+        <p:blipFill>
+          <a:blip r:embed="rId2">
+            <a:extLst>
+              <a:ext uri="{28A0092B-C50C-407E-A947-70E740481C1C}">
+                <a14:useLocalDpi xmlns:a14="http://schemas.microsoft.com/office/drawing/2010/main" val="0"/>
+              </a:ext>
+            </a:extLst>
+          </a:blip>
+          <a:stretch>
+            <a:fillRect/>
+          </a:stretch>
+        </p:blipFill>
+        <p:spPr>
+          <a:xfrm>
+            <a:off x="0" y="3429000"/>
+            <a:ext cx="4610419" cy="3428999"/>
+          </a:xfrm>
+          <a:prstGeom prst="rect">
+            <a:avLst/>
+          </a:prstGeom>
+        </p:spPr>
+      </p:pic>
+      <p:pic>
+        <p:nvPicPr>
+          <p:cNvPr id="6" name="Afbeelding 5"/>
+          <p:cNvPicPr>
+            <a:picLocks noChangeAspect="1"/>
+          </p:cNvPicPr>
+          <p:nvPr/>
+        </p:nvPicPr>
+        <p:blipFill>
+          <a:blip r:embed="rId3">
+            <a:extLst>
+              <a:ext uri="{28A0092B-C50C-407E-A947-70E740481C1C}">
+                <a14:useLocalDpi xmlns:a14="http://schemas.microsoft.com/office/drawing/2010/main" val="0"/>
+              </a:ext>
+            </a:extLst>
+          </a:blip>
+          <a:stretch>
+            <a:fillRect/>
+          </a:stretch>
+        </p:blipFill>
+        <p:spPr>
+          <a:xfrm>
+            <a:off x="-13855" y="1"/>
+            <a:ext cx="4624274" cy="3439304"/>
+          </a:xfrm>
+          <a:prstGeom prst="rect">
+            <a:avLst/>
+          </a:prstGeom>
+        </p:spPr>
+      </p:pic>
+    </p:spTree>
+    <p:extLst>
+      <p:ext uri="{BB962C8B-B14F-4D97-AF65-F5344CB8AC3E}">
+        <p14:creationId xmlns:p14="http://schemas.microsoft.com/office/powerpoint/2010/main" val="3063974063"/>
+      </p:ext>
+    </p:extLst>
+  </p:cSld>
+  <p:clrMapOvr>
+    <a:masterClrMapping/>
+  </p:clrMapOvr>
+</p:sld>
+</file>
+
+<file path=ppt/slides/slide8.xml><?xml version="1.0" encoding="utf-8"?>
+<p:sld xmlns:a="http://schemas.openxmlformats.org/drawingml/2006/main" xmlns:r="http://schemas.openxmlformats.org/officeDocument/2006/relationships" xmlns:p="http://schemas.openxmlformats.org/presentationml/2006/main">
+  <p:cSld>
+    <p:spTree>
+      <p:nvGrpSpPr>
+        <p:cNvPr id="1" name=""/>
+        <p:cNvGrpSpPr/>
+        <p:nvPr/>
+      </p:nvGrpSpPr>
+      <p:grpSpPr>
+        <a:xfrm>
+          <a:off x="0" y="0"/>
+          <a:ext cx="0" cy="0"/>
+          <a:chOff x="0" y="0"/>
+          <a:chExt cx="0" cy="0"/>
+        </a:xfrm>
+      </p:grpSpPr>
+      <p:sp>
+        <p:nvSpPr>
+          <p:cNvPr id="4" name="Tijdelijke aanduiding voor inhoud 2"/>
+          <p:cNvSpPr txBox="1">
+            <a:spLocks noGrp="1"/>
+          </p:cNvSpPr>
+          <p:nvPr>
+            <p:ph idx="1"/>
+          </p:nvPr>
+        </p:nvSpPr>
+        <p:spPr>
+          <a:xfrm>
+            <a:off x="5334000" y="914400"/>
+            <a:ext cx="4114800" cy="6934198"/>
+          </a:xfrm>
+          <a:prstGeom prst="rect">
+            <a:avLst/>
+          </a:prstGeom>
+        </p:spPr>
+        <p:txBody>
+          <a:bodyPr vert="horz" lIns="91440" tIns="45720" rIns="91440" bIns="45720" rtlCol="0">
+            <a:normAutofit/>
+          </a:bodyPr>
+          <a:lstStyle>
+            <a:lvl1pPr marL="342900" indent="-342900" algn="l" defTabSz="914400" rtl="0" eaLnBrk="1" latinLnBrk="0" hangingPunct="1">
+              <a:spcBef>
+                <a:spcPct val="20000"/>
+              </a:spcBef>
+              <a:buFont typeface="Arial" panose="020B0604020202020204" pitchFamily="34" charset="0"/>
+              <a:buChar char="•"/>
+              <a:defRPr sz="3200" kern="1200">
+                <a:solidFill>
+                  <a:schemeClr val="tx1"/>
+                </a:solidFill>
+                <a:latin typeface="+mn-lt"/>
+                <a:ea typeface="+mn-ea"/>
+                <a:cs typeface="+mn-cs"/>
+              </a:defRPr>
+            </a:lvl1pPr>
+            <a:lvl2pPr marL="742950" indent="-285750" algn="l" defTabSz="914400" rtl="0" eaLnBrk="1" latinLnBrk="0" hangingPunct="1">
+              <a:spcBef>
+                <a:spcPct val="20000"/>
+              </a:spcBef>
+              <a:buFont typeface="Arial" panose="020B0604020202020204" pitchFamily="34" charset="0"/>
+              <a:buChar char="–"/>
+              <a:defRPr sz="2800" kern="1200">
+                <a:solidFill>
+                  <a:schemeClr val="tx1"/>
+                </a:solidFill>
+                <a:latin typeface="+mn-lt"/>
+                <a:ea typeface="+mn-ea"/>
+                <a:cs typeface="+mn-cs"/>
+              </a:defRPr>
+            </a:lvl2pPr>
+            <a:lvl3pPr marL="1143000" indent="-228600" algn="l" defTabSz="914400" rtl="0" eaLnBrk="1" latinLnBrk="0" hangingPunct="1">
+              <a:spcBef>
+                <a:spcPct val="20000"/>
+              </a:spcBef>
+              <a:buFont typeface="Arial" panose="020B0604020202020204" pitchFamily="34" charset="0"/>
+              <a:buChar char="•"/>
+              <a:defRPr sz="2400" kern="1200">
+                <a:solidFill>
+                  <a:schemeClr val="tx1"/>
+                </a:solidFill>
+                <a:latin typeface="+mn-lt"/>
+                <a:ea typeface="+mn-ea"/>
+                <a:cs typeface="+mn-cs"/>
+              </a:defRPr>
+            </a:lvl3pPr>
+            <a:lvl4pPr marL="1600200" indent="-228600" algn="l" defTabSz="914400" rtl="0" eaLnBrk="1" latinLnBrk="0" hangingPunct="1">
+              <a:spcBef>
+                <a:spcPct val="20000"/>
+              </a:spcBef>
+              <a:buFont typeface="Arial" panose="020B0604020202020204" pitchFamily="34" charset="0"/>
+              <a:buChar char="–"/>
+              <a:defRPr sz="2000" kern="1200">
+                <a:solidFill>
+                  <a:schemeClr val="tx1"/>
+                </a:solidFill>
+                <a:latin typeface="+mn-lt"/>
+                <a:ea typeface="+mn-ea"/>
+                <a:cs typeface="+mn-cs"/>
+              </a:defRPr>
+            </a:lvl4pPr>
+            <a:lvl5pPr marL="2057400" indent="-228600" algn="l" defTabSz="914400" rtl="0" eaLnBrk="1" latinLnBrk="0" hangingPunct="1">
+              <a:spcBef>
+                <a:spcPct val="20000"/>
+              </a:spcBef>
+              <a:buFont typeface="Arial" panose="020B0604020202020204" pitchFamily="34" charset="0"/>
+              <a:buChar char="»"/>
+              <a:defRPr sz="2000" kern="1200">
+                <a:solidFill>
+                  <a:schemeClr val="tx1"/>
+                </a:solidFill>
+                <a:latin typeface="+mn-lt"/>
+                <a:ea typeface="+mn-ea"/>
+                <a:cs typeface="+mn-cs"/>
+              </a:defRPr>
+            </a:lvl5pPr>
+            <a:lvl6pPr marL="2514600" indent="-228600" algn="l" defTabSz="914400" rtl="0" eaLnBrk="1" latinLnBrk="0" hangingPunct="1">
+              <a:spcBef>
+                <a:spcPct val="20000"/>
+              </a:spcBef>
+              <a:buFont typeface="Arial" panose="020B0604020202020204" pitchFamily="34" charset="0"/>
+              <a:buChar char="•"/>
+              <a:defRPr sz="2000" kern="1200">
+                <a:solidFill>
+                  <a:schemeClr val="tx1"/>
+                </a:solidFill>
+                <a:latin typeface="+mn-lt"/>
+                <a:ea typeface="+mn-ea"/>
+                <a:cs typeface="+mn-cs"/>
+              </a:defRPr>
+            </a:lvl6pPr>
+            <a:lvl7pPr marL="2971800" indent="-228600" algn="l" defTabSz="914400" rtl="0" eaLnBrk="1" latinLnBrk="0" hangingPunct="1">
+              <a:spcBef>
+                <a:spcPct val="20000"/>
+              </a:spcBef>
+              <a:buFont typeface="Arial" panose="020B0604020202020204" pitchFamily="34" charset="0"/>
+              <a:buChar char="•"/>
+              <a:defRPr sz="2000" kern="1200">
+                <a:solidFill>
+                  <a:schemeClr val="tx1"/>
+                </a:solidFill>
+                <a:latin typeface="+mn-lt"/>
+                <a:ea typeface="+mn-ea"/>
+                <a:cs typeface="+mn-cs"/>
+              </a:defRPr>
+            </a:lvl7pPr>
+            <a:lvl8pPr marL="3429000" indent="-228600" algn="l" defTabSz="914400" rtl="0" eaLnBrk="1" latinLnBrk="0" hangingPunct="1">
+              <a:spcBef>
+                <a:spcPct val="20000"/>
+              </a:spcBef>
+              <a:buFont typeface="Arial" panose="020B0604020202020204" pitchFamily="34" charset="0"/>
+              <a:buChar char="•"/>
+              <a:defRPr sz="2000" kern="1200">
+                <a:solidFill>
+                  <a:schemeClr val="tx1"/>
+                </a:solidFill>
+                <a:latin typeface="+mn-lt"/>
+                <a:ea typeface="+mn-ea"/>
+                <a:cs typeface="+mn-cs"/>
+              </a:defRPr>
+            </a:lvl8pPr>
+            <a:lvl9pPr marL="3886200" indent="-228600" algn="l" defTabSz="914400" rtl="0" eaLnBrk="1" latinLnBrk="0" hangingPunct="1">
+              <a:spcBef>
+                <a:spcPct val="20000"/>
+              </a:spcBef>
+              <a:buFont typeface="Arial" panose="020B0604020202020204" pitchFamily="34" charset="0"/>
+              <a:buChar char="•"/>
+              <a:defRPr sz="2000" kern="1200">
+                <a:solidFill>
+                  <a:schemeClr val="tx1"/>
+                </a:solidFill>
+                <a:latin typeface="+mn-lt"/>
+                <a:ea typeface="+mn-ea"/>
+                <a:cs typeface="+mn-cs"/>
+              </a:defRPr>
+            </a:lvl9pPr>
+          </a:lstStyle>
+          <a:p>
+            <a:pPr marL="0" indent="0">
+              <a:buFont typeface="Arial" panose="020B0604020202020204" pitchFamily="34" charset="0"/>
+              <a:buNone/>
+            </a:pPr>
+            <a:r>
+              <a:rPr lang="nl-NL" dirty="0" smtClean="0"/>
+              <a:t>g = 0.8</a:t>
+            </a:r>
+          </a:p>
+          <a:p>
+            <a:pPr marL="0" indent="0">
+              <a:buFont typeface="Arial" panose="020B0604020202020204" pitchFamily="34" charset="0"/>
+              <a:buNone/>
+            </a:pPr>
+            <a:r>
+              <a:rPr lang="nl-NL" dirty="0" err="1" smtClean="0"/>
+              <a:t>mu_s</a:t>
+            </a:r>
+            <a:r>
+              <a:rPr lang="nl-NL" dirty="0" smtClean="0"/>
+              <a:t>* = 10 / cm^2</a:t>
+            </a:r>
+          </a:p>
+          <a:p>
+            <a:pPr marL="0" indent="0">
+              <a:buFont typeface="Arial" panose="020B0604020202020204" pitchFamily="34" charset="0"/>
+              <a:buNone/>
+            </a:pPr>
+            <a:r>
+              <a:rPr lang="nl-NL" dirty="0" smtClean="0"/>
+              <a:t>Aantal = 100.000</a:t>
+            </a:r>
+          </a:p>
+          <a:p>
+            <a:pPr marL="0" indent="0">
+              <a:buNone/>
+            </a:pPr>
+            <a:r>
+              <a:rPr lang="nl-NL" dirty="0"/>
+              <a:t>blue </a:t>
+            </a:r>
+            <a:r>
+              <a:rPr lang="nl-NL" dirty="0" smtClean="0"/>
+              <a:t>=&gt; r </a:t>
+            </a:r>
+            <a:r>
+              <a:rPr lang="nl-NL" dirty="0"/>
+              <a:t>= </a:t>
+            </a:r>
+            <a:r>
+              <a:rPr lang="nl-NL" dirty="0" smtClean="0"/>
+              <a:t>0.1 cm </a:t>
+            </a:r>
+            <a:endParaRPr lang="nl-NL" dirty="0"/>
+          </a:p>
+          <a:p>
+            <a:pPr marL="0" indent="0">
+              <a:buNone/>
+            </a:pPr>
+            <a:r>
+              <a:rPr lang="nl-NL" dirty="0"/>
+              <a:t>green </a:t>
+            </a:r>
+            <a:r>
+              <a:rPr lang="nl-NL" dirty="0" smtClean="0"/>
+              <a:t>=&gt; r = 0.2 cm</a:t>
+            </a:r>
+            <a:endParaRPr lang="nl-NL" dirty="0"/>
+          </a:p>
+          <a:p>
+            <a:pPr marL="0" indent="0">
+              <a:buNone/>
+            </a:pPr>
+            <a:r>
+              <a:rPr lang="nl-NL" dirty="0"/>
+              <a:t>red </a:t>
+            </a:r>
+            <a:r>
+              <a:rPr lang="nl-NL" dirty="0" smtClean="0"/>
+              <a:t>=&gt; r </a:t>
+            </a:r>
+            <a:r>
+              <a:rPr lang="nl-NL" dirty="0"/>
+              <a:t>= </a:t>
+            </a:r>
+            <a:r>
+              <a:rPr lang="nl-NL" dirty="0" smtClean="0"/>
+              <a:t>0.3 cm</a:t>
+            </a:r>
+            <a:endParaRPr lang="nl-NL" dirty="0"/>
+          </a:p>
+          <a:p>
+            <a:pPr marL="0" indent="0">
+              <a:buFont typeface="Arial" panose="020B0604020202020204" pitchFamily="34" charset="0"/>
+              <a:buNone/>
+            </a:pPr>
+            <a:endParaRPr lang="nl-NL" dirty="0"/>
+          </a:p>
+        </p:txBody>
+      </p:sp>
+      <p:pic>
+        <p:nvPicPr>
+          <p:cNvPr id="3" name="Afbeelding 2"/>
+          <p:cNvPicPr>
+            <a:picLocks noChangeAspect="1"/>
+          </p:cNvPicPr>
+          <p:nvPr/>
+        </p:nvPicPr>
+        <p:blipFill>
+          <a:blip r:embed="rId2">
+            <a:extLst>
+              <a:ext uri="{28A0092B-C50C-407E-A947-70E740481C1C}">
+                <a14:useLocalDpi xmlns:a14="http://schemas.microsoft.com/office/drawing/2010/main" val="0"/>
+              </a:ext>
+            </a:extLst>
+          </a:blip>
+          <a:stretch>
+            <a:fillRect/>
+          </a:stretch>
+        </p:blipFill>
+        <p:spPr>
+          <a:xfrm>
+            <a:off x="27709" y="914400"/>
+            <a:ext cx="5334000" cy="3967163"/>
+          </a:xfrm>
+          <a:prstGeom prst="rect">
+            <a:avLst/>
+          </a:prstGeom>
+        </p:spPr>
+      </p:pic>
+    </p:spTree>
+    <p:extLst>
+      <p:ext uri="{BB962C8B-B14F-4D97-AF65-F5344CB8AC3E}">
+        <p14:creationId xmlns:p14="http://schemas.microsoft.com/office/powerpoint/2010/main" val="2910465931"/>
       </p:ext>
     </p:extLst>
   </p:cSld>

</xml_diff>